<commit_message>
Erste Version mit mehr Testcases
</commit_message>
<xml_diff>
--- a/2016-xx-xx DF JPA Pitfalls.pptx
+++ b/2016-xx-xx DF JPA Pitfalls.pptx
@@ -5,28 +5,30 @@
     <p:sldMasterId id="2147483648" r:id="rId4"/>
   </p:sldMasterIdLst>
   <p:notesMasterIdLst>
-    <p:notesMasterId r:id="rId21"/>
+    <p:notesMasterId r:id="rId23"/>
   </p:notesMasterIdLst>
   <p:handoutMasterIdLst>
-    <p:handoutMasterId r:id="rId22"/>
+    <p:handoutMasterId r:id="rId24"/>
   </p:handoutMasterIdLst>
   <p:sldIdLst>
     <p:sldId id="268" r:id="rId5"/>
     <p:sldId id="269" r:id="rId6"/>
     <p:sldId id="270" r:id="rId7"/>
-    <p:sldId id="271" r:id="rId8"/>
-    <p:sldId id="272" r:id="rId9"/>
-    <p:sldId id="279" r:id="rId10"/>
-    <p:sldId id="280" r:id="rId11"/>
-    <p:sldId id="281" r:id="rId12"/>
+    <p:sldId id="278" r:id="rId8"/>
+    <p:sldId id="284" r:id="rId9"/>
+    <p:sldId id="273" r:id="rId10"/>
+    <p:sldId id="274" r:id="rId11"/>
+    <p:sldId id="280" r:id="rId12"/>
     <p:sldId id="282" r:id="rId13"/>
-    <p:sldId id="283" r:id="rId14"/>
-    <p:sldId id="273" r:id="rId15"/>
-    <p:sldId id="274" r:id="rId16"/>
-    <p:sldId id="275" r:id="rId17"/>
-    <p:sldId id="276" r:id="rId18"/>
-    <p:sldId id="277" r:id="rId19"/>
-    <p:sldId id="278" r:id="rId20"/>
+    <p:sldId id="281" r:id="rId14"/>
+    <p:sldId id="276" r:id="rId15"/>
+    <p:sldId id="283" r:id="rId16"/>
+    <p:sldId id="271" r:id="rId17"/>
+    <p:sldId id="275" r:id="rId18"/>
+    <p:sldId id="272" r:id="rId19"/>
+    <p:sldId id="277" r:id="rId20"/>
+    <p:sldId id="285" r:id="rId21"/>
+    <p:sldId id="279" r:id="rId22"/>
   </p:sldIdLst>
   <p:sldSz cx="9144000" cy="6858000" type="screen4x3"/>
   <p:notesSz cx="7099300" cy="10234613"/>
@@ -301,7 +303,7 @@
           <a:p>
             <a:fld id="{433AB391-F064-9643-AD1D-16C0BE7EEBAD}" type="datetimeFigureOut">
               <a:rPr lang="de-DE" smtClean="0"/>
-              <a:t>16.03.16</a:t>
+              <a:t>08.01.17</a:t>
             </a:fld>
             <a:endParaRPr lang="de-DE"/>
           </a:p>
@@ -525,7 +527,7 @@
           </a:ln>
           <a:extLst>
             <a:ext uri="{909E8E84-426E-40dd-AFC4-6F175D3DCCD1}">
-              <a14:hiddenFill xmlns:a14="http://schemas.microsoft.com/office/drawing/2010/main" xmlns="">
+              <a14:hiddenFill xmlns="" xmlns:a14="http://schemas.microsoft.com/office/drawing/2010/main">
                 <a:solidFill>
                   <a:srgbClr val="FFFFFF"/>
                 </a:solidFill>
@@ -830,6 +832,91 @@
 </p:notesMaster>
 </file>
 
+<file path=ppt/notesSlides/notesSlide1.xml><?xml version="1.0" encoding="utf-8"?>
+<p:notes xmlns:a="http://schemas.openxmlformats.org/drawingml/2006/main" xmlns:r="http://schemas.openxmlformats.org/officeDocument/2006/relationships" xmlns:p="http://schemas.openxmlformats.org/presentationml/2006/main">
+  <p:cSld>
+    <p:spTree>
+      <p:nvGrpSpPr>
+        <p:cNvPr id="1" name=""/>
+        <p:cNvGrpSpPr/>
+        <p:nvPr/>
+      </p:nvGrpSpPr>
+      <p:grpSpPr>
+        <a:xfrm>
+          <a:off x="0" y="0"/>
+          <a:ext cx="0" cy="0"/>
+          <a:chOff x="0" y="0"/>
+          <a:chExt cx="0" cy="0"/>
+        </a:xfrm>
+      </p:grpSpPr>
+      <p:sp>
+        <p:nvSpPr>
+          <p:cNvPr id="2" name="Folienbildplatzhalter 1"/>
+          <p:cNvSpPr>
+            <a:spLocks noGrp="1" noRot="1" noChangeAspect="1"/>
+          </p:cNvSpPr>
+          <p:nvPr>
+            <p:ph type="sldImg"/>
+          </p:nvPr>
+        </p:nvSpPr>
+        <p:spPr/>
+      </p:sp>
+      <p:sp>
+        <p:nvSpPr>
+          <p:cNvPr id="3" name="Notizenplatzhalter 2"/>
+          <p:cNvSpPr>
+            <a:spLocks noGrp="1"/>
+          </p:cNvSpPr>
+          <p:nvPr>
+            <p:ph type="body" idx="1"/>
+          </p:nvPr>
+        </p:nvSpPr>
+        <p:spPr/>
+        <p:txBody>
+          <a:bodyPr/>
+          <a:lstStyle/>
+          <a:p>
+            <a:endParaRPr lang="de-DE"/>
+          </a:p>
+        </p:txBody>
+      </p:sp>
+      <p:sp>
+        <p:nvSpPr>
+          <p:cNvPr id="4" name="Foliennummernplatzhalter 3"/>
+          <p:cNvSpPr>
+            <a:spLocks noGrp="1"/>
+          </p:cNvSpPr>
+          <p:nvPr>
+            <p:ph type="sldNum" sz="quarter" idx="10"/>
+          </p:nvPr>
+        </p:nvSpPr>
+        <p:spPr/>
+        <p:txBody>
+          <a:bodyPr/>
+          <a:lstStyle/>
+          <a:p>
+            <a:fld id="{5EF431E7-9370-4A81-8E0C-57EF47BAE865}" type="slidenum">
+              <a:rPr lang="de-DE" smtClean="0"/>
+              <a:pPr/>
+              <a:t>1</a:t>
+            </a:fld>
+            <a:endParaRPr lang="de-DE"/>
+          </a:p>
+        </p:txBody>
+      </p:sp>
+    </p:spTree>
+    <p:extLst>
+      <p:ext uri="{BB962C8B-B14F-4D97-AF65-F5344CB8AC3E}">
+        <p14:creationId xmlns:p14="http://schemas.microsoft.com/office/powerpoint/2010/main" val="1570681107"/>
+      </p:ext>
+    </p:extLst>
+  </p:cSld>
+  <p:clrMapOvr>
+    <a:masterClrMapping/>
+  </p:clrMapOvr>
+</p:notes>
+</file>
+
 <file path=ppt/slideLayouts/slideLayout1.xml><?xml version="1.0" encoding="utf-8"?>
 <p:sldLayout xmlns:a="http://schemas.openxmlformats.org/drawingml/2006/main" xmlns:r="http://schemas.openxmlformats.org/officeDocument/2006/relationships" xmlns:p="http://schemas.openxmlformats.org/presentationml/2006/main" showMasterSp="0" type="title" preserve="1">
   <p:cSld name="Titelfolie">
@@ -879,7 +966,7 @@
           </a:ln>
           <a:extLst>
             <a:ext uri="{91240B29-F687-4f45-9708-019B960494DF}">
-              <a14:hiddenLine xmlns:a14="http://schemas.microsoft.com/office/drawing/2010/main" xmlns="" w="9525">
+              <a14:hiddenLine xmlns="" xmlns:a14="http://schemas.microsoft.com/office/drawing/2010/main" w="9525">
                 <a:solidFill>
                   <a:srgbClr val="000000"/>
                 </a:solidFill>
@@ -915,7 +1002,7 @@
           </a:xfrm>
           <a:extLst>
             <a:ext uri="{91240B29-F687-4f45-9708-019B960494DF}">
-              <a14:hiddenLine xmlns:a14="http://schemas.microsoft.com/office/drawing/2010/main" xmlns="" w="9525" algn="ctr">
+              <a14:hiddenLine xmlns="" xmlns:a14="http://schemas.microsoft.com/office/drawing/2010/main" w="9525" algn="ctr">
                 <a:solidFill>
                   <a:srgbClr val="000000"/>
                 </a:solidFill>
@@ -925,7 +1012,7 @@
               </a14:hiddenLine>
             </a:ext>
             <a:ext uri="{AF507438-7753-43e0-B8FC-AC1667EBCBE1}">
-              <a14:hiddenEffects xmlns:a14="http://schemas.microsoft.com/office/drawing/2010/main" xmlns="">
+              <a14:hiddenEffects xmlns="" xmlns:a14="http://schemas.microsoft.com/office/drawing/2010/main">
                 <a:effectLst>
                   <a:outerShdw dist="35921" dir="2700000" algn="ctr" rotWithShape="0">
                     <a:srgbClr val="808080"/>
@@ -971,7 +1058,7 @@
           </a:xfrm>
           <a:extLst>
             <a:ext uri="{91240B29-F687-4f45-9708-019B960494DF}">
-              <a14:hiddenLine xmlns:a14="http://schemas.microsoft.com/office/drawing/2010/main" xmlns="" w="9525" algn="ctr">
+              <a14:hiddenLine xmlns="" xmlns:a14="http://schemas.microsoft.com/office/drawing/2010/main" w="9525" algn="ctr">
                 <a:solidFill>
                   <a:srgbClr val="000000"/>
                 </a:solidFill>
@@ -981,7 +1068,7 @@
               </a14:hiddenLine>
             </a:ext>
             <a:ext uri="{AF507438-7753-43e0-B8FC-AC1667EBCBE1}">
-              <a14:hiddenEffects xmlns:a14="http://schemas.microsoft.com/office/drawing/2010/main" xmlns="">
+              <a14:hiddenEffects xmlns="" xmlns:a14="http://schemas.microsoft.com/office/drawing/2010/main">
                 <a:effectLst>
                   <a:outerShdw dist="35921" dir="2700000" algn="ctr" rotWithShape="0">
                     <a:srgbClr val="808080"/>
@@ -1044,14 +1131,14 @@
           </a:ln>
           <a:extLst>
             <a:ext uri="{909E8E84-426E-40dd-AFC4-6F175D3DCCD1}">
-              <a14:hiddenFill xmlns:a14="http://schemas.microsoft.com/office/drawing/2010/main" xmlns="">
+              <a14:hiddenFill xmlns="" xmlns:a14="http://schemas.microsoft.com/office/drawing/2010/main">
                 <a:solidFill>
                   <a:srgbClr val="FFFFFF"/>
                 </a:solidFill>
               </a14:hiddenFill>
             </a:ext>
             <a:ext uri="{91240B29-F687-4f45-9708-019B960494DF}">
-              <a14:hiddenLine xmlns:a14="http://schemas.microsoft.com/office/drawing/2010/main" xmlns="" w="9525">
+              <a14:hiddenLine xmlns="" xmlns:a14="http://schemas.microsoft.com/office/drawing/2010/main" w="9525">
                 <a:solidFill>
                   <a:srgbClr val="000000"/>
                 </a:solidFill>
@@ -3560,9 +3647,9 @@
             </a:lvl1pPr>
           </a:lstStyle>
           <a:p>
-            <a:fld id="{D39BBA4D-B856-7B40-9294-4392DE19305E}" type="datetime1">
+            <a:fld id="{F83D804D-B1FF-3445-B74B-E1902EDCF3B2}" type="datetime1">
               <a:rPr lang="de-DE" smtClean="0"/>
-              <a:t>16.03.16</a:t>
+              <a:t>08.01.17</a:t>
             </a:fld>
             <a:endParaRPr lang="de-DE"/>
           </a:p>
@@ -3614,7 +3701,7 @@
           <a:p>
             <a:r>
               <a:rPr lang="de-DE" smtClean="0"/>
-              <a:t>Copyright © 2015 – akquinet AG</a:t>
+              <a:t>Copyright © 2017 – akquinet AG</a:t>
             </a:r>
             <a:endParaRPr lang="de-DE"/>
           </a:p>
@@ -3683,7 +3770,7 @@
           </a:ln>
           <a:extLst>
             <a:ext uri="{91240B29-F687-4f45-9708-019B960494DF}">
-              <a14:hiddenLine xmlns:a14="http://schemas.microsoft.com/office/drawing/2010/main" xmlns="" w="9525" algn="ctr">
+              <a14:hiddenLine xmlns="" xmlns:a14="http://schemas.microsoft.com/office/drawing/2010/main" w="9525" algn="ctr">
                 <a:solidFill>
                   <a:srgbClr val="000000"/>
                 </a:solidFill>
@@ -3778,14 +3865,14 @@
           </a:ln>
           <a:extLst>
             <a:ext uri="{909E8E84-426E-40dd-AFC4-6F175D3DCCD1}">
-              <a14:hiddenFill xmlns:a14="http://schemas.microsoft.com/office/drawing/2010/main" xmlns="">
+              <a14:hiddenFill xmlns="" xmlns:a14="http://schemas.microsoft.com/office/drawing/2010/main">
                 <a:solidFill>
                   <a:srgbClr val="FFFFFF"/>
                 </a:solidFill>
               </a14:hiddenFill>
             </a:ext>
             <a:ext uri="{91240B29-F687-4f45-9708-019B960494DF}">
-              <a14:hiddenLine xmlns:a14="http://schemas.microsoft.com/office/drawing/2010/main" xmlns="" w="9525">
+              <a14:hiddenLine xmlns="" xmlns:a14="http://schemas.microsoft.com/office/drawing/2010/main" w="9525">
                 <a:solidFill>
                   <a:srgbClr val="000000"/>
                 </a:solidFill>
@@ -3837,14 +3924,14 @@
           </a:ln>
           <a:extLst>
             <a:ext uri="{909E8E84-426E-40dd-AFC4-6F175D3DCCD1}">
-              <a14:hiddenFill xmlns:a14="http://schemas.microsoft.com/office/drawing/2010/main" xmlns="">
+              <a14:hiddenFill xmlns="" xmlns:a14="http://schemas.microsoft.com/office/drawing/2010/main">
                 <a:solidFill>
                   <a:srgbClr val="FFFFFF"/>
                 </a:solidFill>
               </a14:hiddenFill>
             </a:ext>
             <a:ext uri="{91240B29-F687-4f45-9708-019B960494DF}">
-              <a14:hiddenLine xmlns:a14="http://schemas.microsoft.com/office/drawing/2010/main" xmlns="" w="9525">
+              <a14:hiddenLine xmlns="" xmlns:a14="http://schemas.microsoft.com/office/drawing/2010/main" w="9525">
                 <a:solidFill>
                   <a:srgbClr val="000000"/>
                 </a:solidFill>
@@ -3944,9 +4031,9 @@
             </a:lvl1pPr>
           </a:lstStyle>
           <a:p>
-            <a:fld id="{931795EA-C9E3-4A4B-9CE7-B2F31085E081}" type="datetime1">
+            <a:fld id="{5882B6C0-5A1E-2048-8776-CE11CE5C9FB6}" type="datetime1">
               <a:rPr lang="de-DE" smtClean="0"/>
-              <a:t>16.03.16</a:t>
+              <a:t>08.01.17</a:t>
             </a:fld>
             <a:endParaRPr lang="de-DE"/>
           </a:p>
@@ -3998,7 +4085,7 @@
           <a:p>
             <a:r>
               <a:rPr lang="de-DE" smtClean="0"/>
-              <a:t>Copyright © 2015 – akquinet AG</a:t>
+              <a:t>Copyright © 2017 – akquinet AG</a:t>
             </a:r>
             <a:endParaRPr lang="de-DE"/>
           </a:p>
@@ -4296,14 +4383,14 @@
           </a:ln>
           <a:extLst>
             <a:ext uri="{909E8E84-426E-40dd-AFC4-6F175D3DCCD1}">
-              <a14:hiddenFill xmlns:a14="http://schemas.microsoft.com/office/drawing/2010/main" xmlns="">
+              <a14:hiddenFill xmlns="" xmlns:a14="http://schemas.microsoft.com/office/drawing/2010/main">
                 <a:solidFill>
                   <a:srgbClr val="FFFFFF"/>
                 </a:solidFill>
               </a14:hiddenFill>
             </a:ext>
             <a:ext uri="{91240B29-F687-4f45-9708-019B960494DF}">
-              <a14:hiddenLine xmlns:a14="http://schemas.microsoft.com/office/drawing/2010/main" xmlns="" w="9525">
+              <a14:hiddenLine xmlns="" xmlns:a14="http://schemas.microsoft.com/office/drawing/2010/main" w="9525">
                 <a:solidFill>
                   <a:srgbClr val="000000"/>
                 </a:solidFill>
@@ -6855,91 +6942,6 @@
           </a:p>
         </p:txBody>
       </p:sp>
-      <p:sp>
-        <p:nvSpPr>
-          <p:cNvPr id="4" name="Foliennummernplatzhalter 3"/>
-          <p:cNvSpPr>
-            <a:spLocks noGrp="1"/>
-          </p:cNvSpPr>
-          <p:nvPr>
-            <p:ph type="sldNum" sz="quarter" idx="4294967295"/>
-          </p:nvPr>
-        </p:nvSpPr>
-        <p:spPr>
-          <a:xfrm>
-            <a:off x="8783638" y="6602413"/>
-            <a:ext cx="360362" cy="152400"/>
-          </a:xfrm>
-        </p:spPr>
-        <p:txBody>
-          <a:bodyPr/>
-          <a:lstStyle/>
-          <a:p>
-            <a:fld id="{21BAB3F4-DC41-436B-8B06-25061C82C533}" type="slidenum">
-              <a:rPr lang="de-DE" smtClean="0"/>
-              <a:pPr/>
-              <a:t>1</a:t>
-            </a:fld>
-            <a:endParaRPr lang="de-DE"/>
-          </a:p>
-        </p:txBody>
-      </p:sp>
-      <p:sp>
-        <p:nvSpPr>
-          <p:cNvPr id="5" name="Datumsplatzhalter 4"/>
-          <p:cNvSpPr>
-            <a:spLocks noGrp="1"/>
-          </p:cNvSpPr>
-          <p:nvPr>
-            <p:ph type="dt" sz="half" idx="4294967295"/>
-          </p:nvPr>
-        </p:nvSpPr>
-        <p:spPr>
-          <a:xfrm>
-            <a:off x="8228013" y="6602413"/>
-            <a:ext cx="915987" cy="152400"/>
-          </a:xfrm>
-        </p:spPr>
-        <p:txBody>
-          <a:bodyPr/>
-          <a:lstStyle/>
-          <a:p>
-            <a:fld id="{D39BBA4D-B856-7B40-9294-4392DE19305E}" type="datetime1">
-              <a:rPr lang="de-DE" smtClean="0"/>
-              <a:t>16.03.16</a:t>
-            </a:fld>
-            <a:endParaRPr lang="de-DE"/>
-          </a:p>
-        </p:txBody>
-      </p:sp>
-      <p:sp>
-        <p:nvSpPr>
-          <p:cNvPr id="6" name="Fußzeilenplatzhalter 5"/>
-          <p:cNvSpPr>
-            <a:spLocks noGrp="1"/>
-          </p:cNvSpPr>
-          <p:nvPr>
-            <p:ph type="ftr" sz="quarter" idx="4294967295"/>
-          </p:nvPr>
-        </p:nvSpPr>
-        <p:spPr>
-          <a:xfrm>
-            <a:off x="0" y="6602413"/>
-            <a:ext cx="6913563" cy="152400"/>
-          </a:xfrm>
-        </p:spPr>
-        <p:txBody>
-          <a:bodyPr/>
-          <a:lstStyle/>
-          <a:p>
-            <a:r>
-              <a:rPr lang="de-DE" smtClean="0"/>
-              <a:t>Copyright © 2015 – akquinet AG</a:t>
-            </a:r>
-            <a:endParaRPr lang="de-DE"/>
-          </a:p>
-        </p:txBody>
-      </p:sp>
       <p:pic>
         <p:nvPicPr>
           <p:cNvPr id="2" name="Bild 1"/>
@@ -6949,7 +6951,7 @@
           <p:nvPr/>
         </p:nvPicPr>
         <p:blipFill>
-          <a:blip r:embed="rId2"/>
+          <a:blip r:embed="rId3"/>
           <a:stretch>
             <a:fillRect/>
           </a:stretch>
@@ -7012,19 +7014,7 @@
           <a:p>
             <a:r>
               <a:rPr lang="de-DE" dirty="0" smtClean="0"/>
-              <a:t>Query </a:t>
-            </a:r>
-            <a:r>
-              <a:rPr lang="de-DE" dirty="0" err="1" smtClean="0"/>
-              <a:t>flush</a:t>
-            </a:r>
-            <a:r>
-              <a:rPr lang="de-DE" dirty="0" smtClean="0"/>
-              <a:t> </a:t>
-            </a:r>
-            <a:r>
-              <a:rPr lang="de-DE" dirty="0" err="1" smtClean="0"/>
-              <a:t>mode</a:t>
+              <a:t>Nicht gesetzte Assoziationen</a:t>
             </a:r>
             <a:endParaRPr lang="de-DE" dirty="0"/>
           </a:p>
@@ -7054,17 +7044,24 @@
             <a:pPr lvl="1"/>
             <a:r>
               <a:rPr lang="de-DE" dirty="0" smtClean="0"/>
-              <a:t>Nutzung von </a:t>
+              <a:t>Navigation führt zu </a:t>
             </a:r>
             <a:r>
               <a:rPr lang="de-DE" dirty="0" err="1" smtClean="0"/>
-              <a:t>FlushMode.COMMIT</a:t>
+              <a:t>inner</a:t>
             </a:r>
             <a:r>
               <a:rPr lang="de-DE" dirty="0" smtClean="0"/>
-              <a:t> führt zu unerwartetem Query Resultat</a:t>
-            </a:r>
-            <a:endParaRPr lang="de-DE" dirty="0"/>
+              <a:t> </a:t>
+            </a:r>
+            <a:r>
+              <a:rPr lang="de-DE" dirty="0" err="1" smtClean="0"/>
+              <a:t>join</a:t>
+            </a:r>
+            <a:r>
+              <a:rPr lang="de-DE" dirty="0" smtClean="0"/>
+              <a:t>, d.h. Instanzen mit leerer Assoziation sind nicht im Query Ergebnis:</a:t>
+            </a:r>
           </a:p>
           <a:p>
             <a:pPr marL="685800" lvl="2" indent="0">
@@ -7074,7 +7071,31 @@
               <a:buNone/>
             </a:pPr>
             <a:r>
-              <a:rPr lang="de-DE" sz="1600" dirty="0" err="1">
+              <a:rPr lang="de-DE" dirty="0">
+                <a:latin typeface="Courier New" charset="0"/>
+                <a:ea typeface="Courier New" charset="0"/>
+                <a:cs typeface="Courier New" charset="0"/>
+              </a:rPr>
+              <a:t>SELECT </a:t>
+            </a:r>
+            <a:r>
+              <a:rPr lang="de-DE" dirty="0" err="1">
+                <a:latin typeface="Courier New" charset="0"/>
+                <a:ea typeface="Courier New" charset="0"/>
+                <a:cs typeface="Courier New" charset="0"/>
+              </a:rPr>
+              <a:t>e.department</a:t>
+            </a:r>
+            <a:r>
+              <a:rPr lang="de-DE" dirty="0">
+                <a:latin typeface="Courier New" charset="0"/>
+                <a:ea typeface="Courier New" charset="0"/>
+                <a:cs typeface="Courier New" charset="0"/>
+              </a:rPr>
+              <a:t> FROM </a:t>
+            </a:r>
+            <a:r>
+              <a:rPr lang="de-DE" dirty="0" err="1">
                 <a:latin typeface="Courier New" charset="0"/>
                 <a:ea typeface="Courier New" charset="0"/>
                 <a:cs typeface="Courier New" charset="0"/>
@@ -7082,7 +7103,7 @@
               <a:t>Employee</a:t>
             </a:r>
             <a:r>
-              <a:rPr lang="de-DE" sz="1600" dirty="0">
+              <a:rPr lang="de-DE" dirty="0">
                 <a:latin typeface="Courier New" charset="0"/>
                 <a:ea typeface="Courier New" charset="0"/>
                 <a:cs typeface="Courier New" charset="0"/>
@@ -7090,383 +7111,32 @@
               <a:t> </a:t>
             </a:r>
             <a:r>
-              <a:rPr lang="de-DE" sz="1600" dirty="0" err="1">
+              <a:rPr lang="de-DE" dirty="0" err="1">
                 <a:latin typeface="Courier New" charset="0"/>
                 <a:ea typeface="Courier New" charset="0"/>
                 <a:cs typeface="Courier New" charset="0"/>
               </a:rPr>
               <a:t>e</a:t>
             </a:r>
-            <a:r>
-              <a:rPr lang="de-DE" sz="1600" dirty="0">
-                <a:latin typeface="Courier New" charset="0"/>
-                <a:ea typeface="Courier New" charset="0"/>
-                <a:cs typeface="Courier New" charset="0"/>
-              </a:rPr>
-              <a:t> = ... // </a:t>
-            </a:r>
-            <a:r>
-              <a:rPr lang="de-DE" sz="1600" dirty="0" err="1">
-                <a:latin typeface="Courier New" charset="0"/>
-                <a:ea typeface="Courier New" charset="0"/>
-                <a:cs typeface="Courier New" charset="0"/>
-              </a:rPr>
-              <a:t>Employee</a:t>
-            </a:r>
-            <a:r>
-              <a:rPr lang="de-DE" sz="1600" dirty="0">
-                <a:latin typeface="Courier New" charset="0"/>
-                <a:ea typeface="Courier New" charset="0"/>
-                <a:cs typeface="Courier New" charset="0"/>
-              </a:rPr>
-              <a:t> </a:t>
-            </a:r>
-            <a:r>
-              <a:rPr lang="de-DE" sz="1600" dirty="0" err="1">
-                <a:latin typeface="Courier New" charset="0"/>
-                <a:ea typeface="Courier New" charset="0"/>
-                <a:cs typeface="Courier New" charset="0"/>
-              </a:rPr>
-              <a:t>with</a:t>
-            </a:r>
-            <a:r>
-              <a:rPr lang="de-DE" sz="1600" dirty="0">
-                <a:latin typeface="Courier New" charset="0"/>
-                <a:ea typeface="Courier New" charset="0"/>
-                <a:cs typeface="Courier New" charset="0"/>
-              </a:rPr>
-              <a:t> </a:t>
-            </a:r>
-            <a:r>
-              <a:rPr lang="de-DE" sz="1600" dirty="0" err="1">
-                <a:latin typeface="Courier New" charset="0"/>
-                <a:ea typeface="Courier New" charset="0"/>
-                <a:cs typeface="Courier New" charset="0"/>
-              </a:rPr>
-              <a:t>salary</a:t>
-            </a:r>
-            <a:r>
-              <a:rPr lang="de-DE" sz="1600" dirty="0">
-                <a:latin typeface="Courier New" charset="0"/>
-                <a:ea typeface="Courier New" charset="0"/>
-                <a:cs typeface="Courier New" charset="0"/>
-              </a:rPr>
-              <a:t> 1500.0</a:t>
-            </a:r>
-            <a:br>
-              <a:rPr lang="de-DE" sz="1600" dirty="0">
-                <a:latin typeface="Courier New" charset="0"/>
-                <a:ea typeface="Courier New" charset="0"/>
-                <a:cs typeface="Courier New" charset="0"/>
-              </a:rPr>
-            </a:br>
-            <a:r>
-              <a:rPr lang="de-DE" sz="1600" dirty="0" err="1">
-                <a:latin typeface="Courier New" charset="0"/>
-                <a:ea typeface="Courier New" charset="0"/>
-                <a:cs typeface="Courier New" charset="0"/>
-              </a:rPr>
-              <a:t>e.setSalary</a:t>
-            </a:r>
-            <a:r>
-              <a:rPr lang="de-DE" sz="1600" dirty="0">
-                <a:latin typeface="Courier New" charset="0"/>
-                <a:ea typeface="Courier New" charset="0"/>
-                <a:cs typeface="Courier New" charset="0"/>
-              </a:rPr>
-              <a:t>(2000.0d);</a:t>
-            </a:r>
-          </a:p>
-          <a:p>
-            <a:pPr marL="685800" lvl="2" indent="0">
-              <a:spcBef>
-                <a:spcPts val="600"/>
-              </a:spcBef>
-              <a:buNone/>
-            </a:pPr>
-            <a:r>
-              <a:rPr lang="de-DE" sz="1600" dirty="0" err="1">
-                <a:latin typeface="Courier New" charset="0"/>
-                <a:ea typeface="Courier New" charset="0"/>
-                <a:cs typeface="Courier New" charset="0"/>
-              </a:rPr>
-              <a:t>q</a:t>
-            </a:r>
-            <a:r>
-              <a:rPr lang="de-DE" sz="1600" dirty="0">
-                <a:latin typeface="Courier New" charset="0"/>
-                <a:ea typeface="Courier New" charset="0"/>
-                <a:cs typeface="Courier New" charset="0"/>
-              </a:rPr>
-              <a:t> = </a:t>
-            </a:r>
-            <a:r>
-              <a:rPr lang="de-DE" sz="1600" dirty="0" err="1">
-                <a:latin typeface="Courier New" charset="0"/>
-                <a:ea typeface="Courier New" charset="0"/>
-                <a:cs typeface="Courier New" charset="0"/>
-              </a:rPr>
-              <a:t>em.createQuery</a:t>
-            </a:r>
-            <a:r>
-              <a:rPr lang="de-DE" sz="1600" dirty="0">
-                <a:latin typeface="Courier New" charset="0"/>
-                <a:ea typeface="Courier New" charset="0"/>
-                <a:cs typeface="Courier New" charset="0"/>
-              </a:rPr>
-              <a:t>(</a:t>
-            </a:r>
-            <a:br>
-              <a:rPr lang="de-DE" sz="1600" dirty="0">
-                <a:latin typeface="Courier New" charset="0"/>
-                <a:ea typeface="Courier New" charset="0"/>
-                <a:cs typeface="Courier New" charset="0"/>
-              </a:rPr>
-            </a:br>
-            <a:r>
-              <a:rPr lang="de-DE" sz="1600" dirty="0">
-                <a:latin typeface="Courier New" charset="0"/>
-                <a:ea typeface="Courier New" charset="0"/>
-                <a:cs typeface="Courier New" charset="0"/>
-              </a:rPr>
-              <a:t>    "SELECT </a:t>
-            </a:r>
-            <a:r>
-              <a:rPr lang="de-DE" sz="1600" dirty="0" err="1">
-                <a:latin typeface="Courier New" charset="0"/>
-                <a:ea typeface="Courier New" charset="0"/>
-                <a:cs typeface="Courier New" charset="0"/>
-              </a:rPr>
-              <a:t>e</a:t>
-            </a:r>
-            <a:r>
-              <a:rPr lang="de-DE" sz="1600" dirty="0">
-                <a:latin typeface="Courier New" charset="0"/>
-                <a:ea typeface="Courier New" charset="0"/>
-                <a:cs typeface="Courier New" charset="0"/>
-              </a:rPr>
-              <a:t> FROM </a:t>
-            </a:r>
-            <a:r>
-              <a:rPr lang="de-DE" sz="1600" dirty="0" err="1">
-                <a:latin typeface="Courier New" charset="0"/>
-                <a:ea typeface="Courier New" charset="0"/>
-                <a:cs typeface="Courier New" charset="0"/>
-              </a:rPr>
-              <a:t>Employee</a:t>
-            </a:r>
-            <a:r>
-              <a:rPr lang="de-DE" sz="1600" dirty="0">
-                <a:latin typeface="Courier New" charset="0"/>
-                <a:ea typeface="Courier New" charset="0"/>
-                <a:cs typeface="Courier New" charset="0"/>
-              </a:rPr>
-              <a:t> </a:t>
-            </a:r>
-            <a:r>
-              <a:rPr lang="de-DE" sz="1600" dirty="0" err="1">
-                <a:latin typeface="Courier New" charset="0"/>
-                <a:ea typeface="Courier New" charset="0"/>
-                <a:cs typeface="Courier New" charset="0"/>
-              </a:rPr>
-              <a:t>e</a:t>
-            </a:r>
-            <a:r>
-              <a:rPr lang="de-DE" sz="1600" dirty="0">
-                <a:latin typeface="Courier New" charset="0"/>
-                <a:ea typeface="Courier New" charset="0"/>
-                <a:cs typeface="Courier New" charset="0"/>
-              </a:rPr>
-              <a:t> WHERE </a:t>
-            </a:r>
-            <a:r>
-              <a:rPr lang="de-DE" sz="1600" dirty="0" err="1">
-                <a:latin typeface="Courier New" charset="0"/>
-                <a:ea typeface="Courier New" charset="0"/>
-                <a:cs typeface="Courier New" charset="0"/>
-              </a:rPr>
-              <a:t>e.salary</a:t>
-            </a:r>
-            <a:r>
-              <a:rPr lang="de-DE" sz="1600" dirty="0">
-                <a:latin typeface="Courier New" charset="0"/>
-                <a:ea typeface="Courier New" charset="0"/>
-                <a:cs typeface="Courier New" charset="0"/>
-              </a:rPr>
-              <a:t> &lt;= 1500.0d");</a:t>
-            </a:r>
-            <a:br>
-              <a:rPr lang="de-DE" sz="1600" dirty="0">
-                <a:latin typeface="Courier New" charset="0"/>
-                <a:ea typeface="Courier New" charset="0"/>
-                <a:cs typeface="Courier New" charset="0"/>
-              </a:rPr>
-            </a:br>
-            <a:r>
-              <a:rPr lang="de-DE" sz="1600" dirty="0" err="1">
-                <a:latin typeface="Courier New" charset="0"/>
-                <a:ea typeface="Courier New" charset="0"/>
-                <a:cs typeface="Courier New" charset="0"/>
-              </a:rPr>
-              <a:t>q.setFlushMode</a:t>
-            </a:r>
-            <a:r>
-              <a:rPr lang="de-DE" sz="1600" dirty="0">
-                <a:latin typeface="Courier New" charset="0"/>
-                <a:ea typeface="Courier New" charset="0"/>
-                <a:cs typeface="Courier New" charset="0"/>
-              </a:rPr>
-              <a:t>(</a:t>
-            </a:r>
-            <a:r>
-              <a:rPr lang="de-DE" sz="1600" dirty="0" err="1">
-                <a:latin typeface="Courier New" charset="0"/>
-                <a:ea typeface="Courier New" charset="0"/>
-                <a:cs typeface="Courier New" charset="0"/>
-              </a:rPr>
-              <a:t>FlushMode.COMMIT</a:t>
-            </a:r>
-            <a:r>
-              <a:rPr lang="de-DE" sz="1600" dirty="0">
-                <a:latin typeface="Courier New" charset="0"/>
-                <a:ea typeface="Courier New" charset="0"/>
-                <a:cs typeface="Courier New" charset="0"/>
-              </a:rPr>
-              <a:t>);</a:t>
-            </a:r>
-          </a:p>
-          <a:p>
-            <a:pPr marL="685800" lvl="2" indent="0">
-              <a:spcBef>
-                <a:spcPts val="600"/>
-              </a:spcBef>
-              <a:buNone/>
-            </a:pPr>
-            <a:r>
-              <a:rPr lang="de-DE" sz="1600" dirty="0">
-                <a:latin typeface="Courier New" charset="0"/>
-                <a:ea typeface="Courier New" charset="0"/>
-                <a:cs typeface="Courier New" charset="0"/>
-              </a:rPr>
-              <a:t>List&lt;</a:t>
-            </a:r>
-            <a:r>
-              <a:rPr lang="de-DE" sz="1600" dirty="0" err="1">
-                <a:latin typeface="Courier New" charset="0"/>
-                <a:ea typeface="Courier New" charset="0"/>
-                <a:cs typeface="Courier New" charset="0"/>
-              </a:rPr>
-              <a:t>Employee</a:t>
-            </a:r>
-            <a:r>
-              <a:rPr lang="de-DE" sz="1600" dirty="0">
-                <a:latin typeface="Courier New" charset="0"/>
-                <a:ea typeface="Courier New" charset="0"/>
-                <a:cs typeface="Courier New" charset="0"/>
-              </a:rPr>
-              <a:t>&gt; </a:t>
-            </a:r>
-            <a:r>
-              <a:rPr lang="de-DE" sz="1600" dirty="0" err="1">
-                <a:latin typeface="Courier New" charset="0"/>
-                <a:ea typeface="Courier New" charset="0"/>
-                <a:cs typeface="Courier New" charset="0"/>
-              </a:rPr>
-              <a:t>result</a:t>
-            </a:r>
-            <a:r>
-              <a:rPr lang="de-DE" sz="1600" dirty="0">
-                <a:latin typeface="Courier New" charset="0"/>
-                <a:ea typeface="Courier New" charset="0"/>
-                <a:cs typeface="Courier New" charset="0"/>
-              </a:rPr>
-              <a:t> = (List&lt;</a:t>
-            </a:r>
-            <a:r>
-              <a:rPr lang="de-DE" sz="1600" dirty="0" err="1">
-                <a:latin typeface="Courier New" charset="0"/>
-                <a:ea typeface="Courier New" charset="0"/>
-                <a:cs typeface="Courier New" charset="0"/>
-              </a:rPr>
-              <a:t>Employee</a:t>
-            </a:r>
-            <a:r>
-              <a:rPr lang="de-DE" sz="1600" dirty="0">
-                <a:latin typeface="Courier New" charset="0"/>
-                <a:ea typeface="Courier New" charset="0"/>
-                <a:cs typeface="Courier New" charset="0"/>
-              </a:rPr>
-              <a:t>&gt;)</a:t>
-            </a:r>
-            <a:r>
-              <a:rPr lang="de-DE" sz="1600" dirty="0" err="1">
-                <a:latin typeface="Courier New" charset="0"/>
-                <a:ea typeface="Courier New" charset="0"/>
-                <a:cs typeface="Courier New" charset="0"/>
-              </a:rPr>
-              <a:t>q.getResultList</a:t>
-            </a:r>
-            <a:r>
-              <a:rPr lang="de-DE" sz="1600" dirty="0">
-                <a:latin typeface="Courier New" charset="0"/>
-                <a:ea typeface="Courier New" charset="0"/>
-                <a:cs typeface="Courier New" charset="0"/>
-              </a:rPr>
-              <a:t>();</a:t>
-            </a:r>
-          </a:p>
-          <a:p>
-            <a:pPr marL="685800" lvl="2" indent="0">
-              <a:spcBef>
-                <a:spcPts val="600"/>
-              </a:spcBef>
-              <a:buNone/>
-            </a:pPr>
-            <a:r>
-              <a:rPr lang="de-DE" sz="1600" dirty="0">
-                <a:latin typeface="Courier New" charset="0"/>
-                <a:ea typeface="Courier New" charset="0"/>
-                <a:cs typeface="Courier New" charset="0"/>
-              </a:rPr>
-              <a:t>// </a:t>
-            </a:r>
-            <a:r>
-              <a:rPr lang="de-DE" sz="1600" dirty="0" err="1">
-                <a:latin typeface="Courier New" charset="0"/>
-                <a:ea typeface="Courier New" charset="0"/>
-                <a:cs typeface="Courier New" charset="0"/>
-              </a:rPr>
-              <a:t>result.contains</a:t>
-            </a:r>
-            <a:r>
-              <a:rPr lang="de-DE" sz="1600" dirty="0">
-                <a:latin typeface="Courier New" charset="0"/>
-                <a:ea typeface="Courier New" charset="0"/>
-                <a:cs typeface="Courier New" charset="0"/>
-              </a:rPr>
-              <a:t>(</a:t>
-            </a:r>
-            <a:r>
-              <a:rPr lang="de-DE" sz="1600" dirty="0" err="1">
-                <a:latin typeface="Courier New" charset="0"/>
-                <a:ea typeface="Courier New" charset="0"/>
-                <a:cs typeface="Courier New" charset="0"/>
-              </a:rPr>
-              <a:t>e</a:t>
-            </a:r>
-            <a:r>
-              <a:rPr lang="de-DE" sz="1600" dirty="0" smtClean="0">
-                <a:latin typeface="Courier New" charset="0"/>
-                <a:ea typeface="Courier New" charset="0"/>
-                <a:cs typeface="Courier New" charset="0"/>
-              </a:rPr>
-              <a:t>)!</a:t>
-            </a:r>
-            <a:endParaRPr lang="de-DE" sz="1600" dirty="0">
-              <a:latin typeface="Courier New" charset="0"/>
-              <a:ea typeface="Courier New" charset="0"/>
-              <a:cs typeface="Courier New" charset="0"/>
+            <a:endParaRPr lang="de-DE" sz="2800" dirty="0">
+              <a:ea typeface="ＭＳ Ｐゴシック" charset="-128"/>
+              <a:cs typeface="ＭＳ Ｐゴシック" charset="-128"/>
             </a:endParaRPr>
+          </a:p>
+          <a:p>
+            <a:pPr marL="344487" lvl="1" indent="-342900"/>
+            <a:r>
+              <a:rPr lang="de-DE" dirty="0" smtClean="0"/>
+              <a:t>=&gt; OUTER </a:t>
+            </a:r>
+            <a:r>
+              <a:rPr lang="de-DE" dirty="0"/>
+              <a:t>JOIN</a:t>
+            </a:r>
+          </a:p>
+          <a:p>
+            <a:pPr lvl="1"/>
+            <a:endParaRPr lang="de-DE" dirty="0" smtClean="0"/>
           </a:p>
         </p:txBody>
       </p:sp>
@@ -7509,9 +7179,9 @@
           <a:bodyPr/>
           <a:lstStyle/>
           <a:p>
-            <a:fld id="{D39BBA4D-B856-7B40-9294-4392DE19305E}" type="datetime1">
+            <a:fld id="{C58B71C2-6347-8A42-9511-CBEFEE28CC08}" type="datetime1">
               <a:rPr lang="de-DE" smtClean="0"/>
-              <a:t>16.03.16</a:t>
+              <a:t>08.01.17</a:t>
             </a:fld>
             <a:endParaRPr lang="de-DE"/>
           </a:p>
@@ -7534,7 +7204,7 @@
           <a:p>
             <a:r>
               <a:rPr lang="de-DE" smtClean="0"/>
-              <a:t>Copyright © 2015 – akquinet AG</a:t>
+              <a:t>Copyright © 2017 – akquinet AG</a:t>
             </a:r>
             <a:endParaRPr lang="de-DE"/>
           </a:p>
@@ -7543,7 +7213,7 @@
     </p:spTree>
     <p:extLst>
       <p:ext uri="{BB962C8B-B14F-4D97-AF65-F5344CB8AC3E}">
-        <p14:creationId xmlns:p14="http://schemas.microsoft.com/office/powerpoint/2010/main" val="1191823879"/>
+        <p14:creationId xmlns:p14="http://schemas.microsoft.com/office/powerpoint/2010/main" val="177187756"/>
       </p:ext>
     </p:extLst>
   </p:cSld>
@@ -7588,7 +7258,7 @@
           <a:p>
             <a:r>
               <a:rPr lang="de-DE" dirty="0" smtClean="0"/>
-              <a:t>Mapping von Vererbung (1)</a:t>
+              <a:t>JPQL UPDATE und Kontext</a:t>
             </a:r>
             <a:endParaRPr lang="de-DE" dirty="0"/>
           </a:p>
@@ -7617,30 +7287,26 @@
           <a:p>
             <a:pPr lvl="1"/>
             <a:r>
+              <a:rPr lang="de-DE" dirty="0" err="1" smtClean="0"/>
+              <a:t>Persistenzkontext</a:t>
+            </a:r>
+            <a:r>
               <a:rPr lang="de-DE" dirty="0" smtClean="0"/>
-              <a:t>Normalisierung auf der Datenbank </a:t>
+              <a:t> wird bei UPDATE oder DELETE JPQL Query nicht synchronisiert</a:t>
             </a:r>
           </a:p>
           <a:p>
             <a:pPr lvl="1"/>
             <a:r>
               <a:rPr lang="de-DE" dirty="0" smtClean="0"/>
-              <a:t>JPA Vererbungs-Strategie: JOINED</a:t>
-            </a:r>
-          </a:p>
-          <a:p>
-            <a:pPr lvl="1"/>
-            <a:r>
-              <a:rPr lang="de-DE" dirty="0" smtClean="0"/>
-              <a:t>=&gt; Viele </a:t>
-            </a:r>
-            <a:r>
-              <a:rPr lang="de-DE" dirty="0" err="1" smtClean="0"/>
-              <a:t>Joins</a:t>
-            </a:r>
-            <a:r>
-              <a:rPr lang="de-DE" dirty="0" smtClean="0"/>
-              <a:t> beim Laden von Instanzen</a:t>
+              <a:t>Cache ist veraltet</a:t>
+            </a:r>
+            <a:r>
+              <a:rPr lang="de-DE" dirty="0" smtClean="0">
+                <a:ea typeface="Courier New" charset="0"/>
+                <a:cs typeface="Courier New" charset="0"/>
+              </a:rPr>
+              <a:t> </a:t>
             </a:r>
             <a:endParaRPr lang="de-DE" dirty="0"/>
           </a:p>
@@ -7685,9 +7351,9 @@
           <a:bodyPr/>
           <a:lstStyle/>
           <a:p>
-            <a:fld id="{D39BBA4D-B856-7B40-9294-4392DE19305E}" type="datetime1">
+            <a:fld id="{68C14B45-0029-6046-B705-490F949C6771}" type="datetime1">
               <a:rPr lang="de-DE" smtClean="0"/>
-              <a:t>16.03.16</a:t>
+              <a:t>08.01.17</a:t>
             </a:fld>
             <a:endParaRPr lang="de-DE"/>
           </a:p>
@@ -7710,7 +7376,7 @@
           <a:p>
             <a:r>
               <a:rPr lang="de-DE" smtClean="0"/>
-              <a:t>Copyright © 2015 – akquinet AG</a:t>
+              <a:t>Copyright © 2017 – akquinet AG</a:t>
             </a:r>
             <a:endParaRPr lang="de-DE"/>
           </a:p>
@@ -7719,7 +7385,7 @@
     </p:spTree>
     <p:extLst>
       <p:ext uri="{BB962C8B-B14F-4D97-AF65-F5344CB8AC3E}">
-        <p14:creationId xmlns:p14="http://schemas.microsoft.com/office/powerpoint/2010/main" val="2065355096"/>
+        <p14:creationId xmlns:p14="http://schemas.microsoft.com/office/powerpoint/2010/main" val="358451836"/>
       </p:ext>
     </p:extLst>
   </p:cSld>
@@ -7764,7 +7430,27 @@
           <a:p>
             <a:r>
               <a:rPr lang="de-DE" dirty="0" smtClean="0"/>
-              <a:t>Mapping von Vererbung (2)</a:t>
+              <a:t>Query </a:t>
+            </a:r>
+            <a:r>
+              <a:rPr lang="de-DE" dirty="0" err="1"/>
+              <a:t>F</a:t>
+            </a:r>
+            <a:r>
+              <a:rPr lang="de-DE" dirty="0" err="1" smtClean="0"/>
+              <a:t>lush</a:t>
+            </a:r>
+            <a:r>
+              <a:rPr lang="de-DE" dirty="0" smtClean="0"/>
+              <a:t> </a:t>
+            </a:r>
+            <a:r>
+              <a:rPr lang="de-DE" dirty="0"/>
+              <a:t>M</a:t>
+            </a:r>
+            <a:r>
+              <a:rPr lang="de-DE" dirty="0" smtClean="0"/>
+              <a:t>ode</a:t>
             </a:r>
             <a:endParaRPr lang="de-DE" dirty="0"/>
           </a:p>
@@ -7785,54 +7471,444 @@
           <a:bodyPr/>
           <a:lstStyle/>
           <a:p>
+            <a:pPr marL="1587" lvl="1" indent="0">
+              <a:buNone/>
+            </a:pPr>
+            <a:r>
+              <a:rPr lang="de-DE" dirty="0" err="1" smtClean="0"/>
+              <a:t>FlushModeType.COMMIT</a:t>
+            </a:r>
             <a:r>
               <a:rPr lang="de-DE" dirty="0" smtClean="0"/>
-              <a:t>Problem:</a:t>
-            </a:r>
-          </a:p>
-          <a:p>
-            <a:pPr lvl="1"/>
+              <a:t> und Query </a:t>
+            </a:r>
             <a:r>
               <a:rPr lang="de-DE" dirty="0" smtClean="0"/>
-              <a:t>Jede Subklasse hat eigene Tabelle </a:t>
-            </a:r>
-          </a:p>
-          <a:p>
-            <a:pPr lvl="1"/>
-            <a:r>
-              <a:rPr lang="de-DE" dirty="0" smtClean="0"/>
-              <a:t>JPA Vererbungs-Strategie: TABLE_PER_CLASS</a:t>
-            </a:r>
-          </a:p>
-          <a:p>
-            <a:pPr lvl="1"/>
-            <a:r>
-              <a:rPr lang="de-DE" dirty="0" smtClean="0"/>
-              <a:t>Nutzung von Assoziationen</a:t>
-            </a:r>
-          </a:p>
-          <a:p>
-            <a:pPr lvl="1"/>
-            <a:r>
-              <a:rPr lang="de-DE" dirty="0" smtClean="0"/>
-              <a:t>=&gt; SQL UNION bei </a:t>
-            </a:r>
-            <a:r>
-              <a:rPr lang="de-DE" dirty="0" err="1" smtClean="0"/>
-              <a:t>Queries</a:t>
-            </a:r>
-            <a:r>
-              <a:rPr lang="de-DE" dirty="0" smtClean="0"/>
-              <a:t> über Superklasse</a:t>
-            </a:r>
-          </a:p>
-          <a:p>
-            <a:pPr lvl="1"/>
-            <a:r>
-              <a:rPr lang="de-DE" dirty="0" smtClean="0"/>
-              <a:t>=&gt; Navigation schwierig</a:t>
+              <a:t>Resultat</a:t>
             </a:r>
             <a:endParaRPr lang="de-DE" dirty="0"/>
+          </a:p>
+          <a:p>
+            <a:pPr marL="685800" lvl="2" indent="0">
+              <a:spcBef>
+                <a:spcPts val="600"/>
+              </a:spcBef>
+              <a:buNone/>
+            </a:pPr>
+            <a:r>
+              <a:rPr lang="de-DE" sz="1600" dirty="0" err="1">
+                <a:latin typeface="Courier New" charset="0"/>
+                <a:ea typeface="Courier New" charset="0"/>
+                <a:cs typeface="Courier New" charset="0"/>
+              </a:rPr>
+              <a:t>Employee</a:t>
+            </a:r>
+            <a:r>
+              <a:rPr lang="de-DE" sz="1600" dirty="0">
+                <a:latin typeface="Courier New" charset="0"/>
+                <a:ea typeface="Courier New" charset="0"/>
+                <a:cs typeface="Courier New" charset="0"/>
+              </a:rPr>
+              <a:t> </a:t>
+            </a:r>
+            <a:r>
+              <a:rPr lang="de-DE" sz="1600" dirty="0" err="1">
+                <a:latin typeface="Courier New" charset="0"/>
+                <a:ea typeface="Courier New" charset="0"/>
+                <a:cs typeface="Courier New" charset="0"/>
+              </a:rPr>
+              <a:t>e</a:t>
+            </a:r>
+            <a:r>
+              <a:rPr lang="de-DE" sz="1600" dirty="0">
+                <a:latin typeface="Courier New" charset="0"/>
+                <a:ea typeface="Courier New" charset="0"/>
+                <a:cs typeface="Courier New" charset="0"/>
+              </a:rPr>
+              <a:t> = ... // </a:t>
+            </a:r>
+            <a:r>
+              <a:rPr lang="de-DE" sz="1600" dirty="0" err="1">
+                <a:latin typeface="Courier New" charset="0"/>
+                <a:ea typeface="Courier New" charset="0"/>
+                <a:cs typeface="Courier New" charset="0"/>
+              </a:rPr>
+              <a:t>Employee</a:t>
+            </a:r>
+            <a:r>
+              <a:rPr lang="de-DE" sz="1600" dirty="0">
+                <a:latin typeface="Courier New" charset="0"/>
+                <a:ea typeface="Courier New" charset="0"/>
+                <a:cs typeface="Courier New" charset="0"/>
+              </a:rPr>
+              <a:t> </a:t>
+            </a:r>
+            <a:r>
+              <a:rPr lang="de-DE" sz="1600" dirty="0" err="1">
+                <a:latin typeface="Courier New" charset="0"/>
+                <a:ea typeface="Courier New" charset="0"/>
+                <a:cs typeface="Courier New" charset="0"/>
+              </a:rPr>
+              <a:t>with</a:t>
+            </a:r>
+            <a:r>
+              <a:rPr lang="de-DE" sz="1600" dirty="0">
+                <a:latin typeface="Courier New" charset="0"/>
+                <a:ea typeface="Courier New" charset="0"/>
+                <a:cs typeface="Courier New" charset="0"/>
+              </a:rPr>
+              <a:t> </a:t>
+            </a:r>
+            <a:r>
+              <a:rPr lang="de-DE" sz="1600" dirty="0" err="1" smtClean="0">
+                <a:latin typeface="Courier New" charset="0"/>
+                <a:ea typeface="Courier New" charset="0"/>
+                <a:cs typeface="Courier New" charset="0"/>
+              </a:rPr>
+              <a:t>weekyhours</a:t>
+            </a:r>
+            <a:r>
+              <a:rPr lang="de-DE" sz="1600" dirty="0" smtClean="0">
+                <a:latin typeface="Courier New" charset="0"/>
+                <a:ea typeface="Courier New" charset="0"/>
+                <a:cs typeface="Courier New" charset="0"/>
+              </a:rPr>
+              <a:t> 40</a:t>
+            </a:r>
+            <a:r>
+              <a:rPr lang="de-DE" sz="1600" dirty="0">
+                <a:latin typeface="Courier New" charset="0"/>
+                <a:ea typeface="Courier New" charset="0"/>
+                <a:cs typeface="Courier New" charset="0"/>
+              </a:rPr>
+              <a:t/>
+            </a:r>
+            <a:br>
+              <a:rPr lang="de-DE" sz="1600" dirty="0">
+                <a:latin typeface="Courier New" charset="0"/>
+                <a:ea typeface="Courier New" charset="0"/>
+                <a:cs typeface="Courier New" charset="0"/>
+              </a:rPr>
+            </a:br>
+            <a:r>
+              <a:rPr lang="de-DE" sz="1600" dirty="0" err="1">
+                <a:latin typeface="Courier New" charset="0"/>
+                <a:ea typeface="Courier New" charset="0"/>
+                <a:cs typeface="Courier New" charset="0"/>
+              </a:rPr>
+              <a:t>e.setWeeklyhours</a:t>
+            </a:r>
+            <a:r>
+              <a:rPr lang="de-DE" sz="1600" dirty="0">
+                <a:latin typeface="Courier New" charset="0"/>
+                <a:ea typeface="Courier New" charset="0"/>
+                <a:cs typeface="Courier New" charset="0"/>
+              </a:rPr>
+              <a:t>(41.0d</a:t>
+            </a:r>
+            <a:r>
+              <a:rPr lang="de-DE" sz="1600" dirty="0" smtClean="0">
+                <a:latin typeface="Courier New" charset="0"/>
+                <a:ea typeface="Courier New" charset="0"/>
+                <a:cs typeface="Courier New" charset="0"/>
+              </a:rPr>
+              <a:t>);</a:t>
+            </a:r>
+            <a:endParaRPr lang="de-DE" sz="1600" dirty="0" smtClean="0">
+              <a:latin typeface="Courier New" charset="0"/>
+              <a:ea typeface="Courier New" charset="0"/>
+              <a:cs typeface="Courier New" charset="0"/>
+            </a:endParaRPr>
+          </a:p>
+          <a:p>
+            <a:pPr marL="685800" lvl="2" indent="0">
+              <a:spcBef>
+                <a:spcPts val="600"/>
+              </a:spcBef>
+              <a:buNone/>
+            </a:pPr>
+            <a:r>
+              <a:rPr lang="de-DE" sz="1600" dirty="0" err="1" smtClean="0">
+                <a:latin typeface="Courier New" charset="0"/>
+                <a:ea typeface="Courier New" charset="0"/>
+                <a:cs typeface="Courier New" charset="0"/>
+              </a:rPr>
+              <a:t>q</a:t>
+            </a:r>
+            <a:r>
+              <a:rPr lang="de-DE" sz="1600" dirty="0" smtClean="0">
+                <a:latin typeface="Courier New" charset="0"/>
+                <a:ea typeface="Courier New" charset="0"/>
+                <a:cs typeface="Courier New" charset="0"/>
+              </a:rPr>
+              <a:t> = </a:t>
+            </a:r>
+            <a:r>
+              <a:rPr lang="de-DE" sz="1600" dirty="0" err="1" smtClean="0">
+                <a:latin typeface="Courier New" charset="0"/>
+                <a:ea typeface="Courier New" charset="0"/>
+                <a:cs typeface="Courier New" charset="0"/>
+              </a:rPr>
+              <a:t>em.createQuery</a:t>
+            </a:r>
+            <a:r>
+              <a:rPr lang="de-DE" sz="1600" dirty="0" smtClean="0">
+                <a:latin typeface="Courier New" charset="0"/>
+                <a:ea typeface="Courier New" charset="0"/>
+                <a:cs typeface="Courier New" charset="0"/>
+              </a:rPr>
+              <a:t>(</a:t>
+            </a:r>
+            <a:br>
+              <a:rPr lang="de-DE" sz="1600" dirty="0" smtClean="0">
+                <a:latin typeface="Courier New" charset="0"/>
+                <a:ea typeface="Courier New" charset="0"/>
+                <a:cs typeface="Courier New" charset="0"/>
+              </a:rPr>
+            </a:br>
+            <a:r>
+              <a:rPr lang="de-DE" sz="1600" dirty="0" smtClean="0">
+                <a:latin typeface="Courier New" charset="0"/>
+                <a:ea typeface="Courier New" charset="0"/>
+                <a:cs typeface="Courier New" charset="0"/>
+              </a:rPr>
+              <a:t>    "SELECT </a:t>
+            </a:r>
+            <a:r>
+              <a:rPr lang="de-DE" sz="1600" dirty="0" err="1" smtClean="0">
+                <a:latin typeface="Courier New" charset="0"/>
+                <a:ea typeface="Courier New" charset="0"/>
+                <a:cs typeface="Courier New" charset="0"/>
+              </a:rPr>
+              <a:t>e</a:t>
+            </a:r>
+            <a:r>
+              <a:rPr lang="de-DE" sz="1600" dirty="0" smtClean="0">
+                <a:latin typeface="Courier New" charset="0"/>
+                <a:ea typeface="Courier New" charset="0"/>
+                <a:cs typeface="Courier New" charset="0"/>
+              </a:rPr>
+              <a:t> FROM </a:t>
+            </a:r>
+            <a:r>
+              <a:rPr lang="de-DE" sz="1600" dirty="0" err="1" smtClean="0">
+                <a:latin typeface="Courier New" charset="0"/>
+                <a:ea typeface="Courier New" charset="0"/>
+                <a:cs typeface="Courier New" charset="0"/>
+              </a:rPr>
+              <a:t>Employee</a:t>
+            </a:r>
+            <a:r>
+              <a:rPr lang="de-DE" sz="1600" dirty="0" smtClean="0">
+                <a:latin typeface="Courier New" charset="0"/>
+                <a:ea typeface="Courier New" charset="0"/>
+                <a:cs typeface="Courier New" charset="0"/>
+              </a:rPr>
+              <a:t> </a:t>
+            </a:r>
+            <a:r>
+              <a:rPr lang="de-DE" sz="1600" dirty="0" err="1" smtClean="0">
+                <a:latin typeface="Courier New" charset="0"/>
+                <a:ea typeface="Courier New" charset="0"/>
+                <a:cs typeface="Courier New" charset="0"/>
+              </a:rPr>
+              <a:t>e</a:t>
+            </a:r>
+            <a:r>
+              <a:rPr lang="de-DE" sz="1600" dirty="0" smtClean="0">
+                <a:latin typeface="Courier New" charset="0"/>
+                <a:ea typeface="Courier New" charset="0"/>
+                <a:cs typeface="Courier New" charset="0"/>
+              </a:rPr>
+              <a:t> WHERE </a:t>
+            </a:r>
+            <a:r>
+              <a:rPr lang="de-DE" sz="1600" dirty="0" err="1" smtClean="0">
+                <a:latin typeface="Courier New" charset="0"/>
+                <a:ea typeface="Courier New" charset="0"/>
+                <a:cs typeface="Courier New" charset="0"/>
+              </a:rPr>
+              <a:t>e.weeklyhours</a:t>
+            </a:r>
+            <a:r>
+              <a:rPr lang="de-DE" sz="1600" dirty="0" smtClean="0">
+                <a:latin typeface="Courier New" charset="0"/>
+                <a:ea typeface="Courier New" charset="0"/>
+                <a:cs typeface="Courier New" charset="0"/>
+              </a:rPr>
+              <a:t> &gt; 40.0d");</a:t>
+            </a:r>
+            <a:r>
+              <a:rPr lang="de-DE" sz="1600" dirty="0" smtClean="0">
+                <a:latin typeface="Courier New" charset="0"/>
+                <a:ea typeface="Courier New" charset="0"/>
+                <a:cs typeface="Courier New" charset="0"/>
+              </a:rPr>
+              <a:t/>
+            </a:r>
+            <a:br>
+              <a:rPr lang="de-DE" sz="1600" dirty="0" smtClean="0">
+                <a:latin typeface="Courier New" charset="0"/>
+                <a:ea typeface="Courier New" charset="0"/>
+                <a:cs typeface="Courier New" charset="0"/>
+              </a:rPr>
+            </a:br>
+            <a:r>
+              <a:rPr lang="de-DE" sz="1600" dirty="0" err="1" smtClean="0">
+                <a:latin typeface="Courier New" charset="0"/>
+                <a:ea typeface="Courier New" charset="0"/>
+                <a:cs typeface="Courier New" charset="0"/>
+              </a:rPr>
+              <a:t>q.setFlushMode</a:t>
+            </a:r>
+            <a:r>
+              <a:rPr lang="de-DE" sz="1600" dirty="0" smtClean="0">
+                <a:latin typeface="Courier New" charset="0"/>
+                <a:ea typeface="Courier New" charset="0"/>
+                <a:cs typeface="Courier New" charset="0"/>
+              </a:rPr>
+              <a:t>(</a:t>
+            </a:r>
+            <a:r>
+              <a:rPr lang="de-DE" sz="1600" dirty="0" err="1" smtClean="0">
+                <a:latin typeface="Courier New" charset="0"/>
+                <a:ea typeface="Courier New" charset="0"/>
+                <a:cs typeface="Courier New" charset="0"/>
+              </a:rPr>
+              <a:t>FlushModeType.COMMIT</a:t>
+            </a:r>
+            <a:r>
+              <a:rPr lang="de-DE" sz="1600" dirty="0" smtClean="0">
+                <a:latin typeface="Courier New" charset="0"/>
+                <a:ea typeface="Courier New" charset="0"/>
+                <a:cs typeface="Courier New" charset="0"/>
+              </a:rPr>
+              <a:t>);</a:t>
+            </a:r>
+            <a:br>
+              <a:rPr lang="de-DE" sz="1600" dirty="0" smtClean="0">
+                <a:latin typeface="Courier New" charset="0"/>
+                <a:ea typeface="Courier New" charset="0"/>
+                <a:cs typeface="Courier New" charset="0"/>
+              </a:rPr>
+            </a:br>
+            <a:r>
+              <a:rPr lang="de-DE" sz="1600" dirty="0" smtClean="0">
+                <a:latin typeface="Courier New" charset="0"/>
+                <a:ea typeface="Courier New" charset="0"/>
+                <a:cs typeface="Courier New" charset="0"/>
+              </a:rPr>
+              <a:t>List&lt;</a:t>
+            </a:r>
+            <a:r>
+              <a:rPr lang="de-DE" sz="1600" dirty="0" err="1" smtClean="0">
+                <a:latin typeface="Courier New" charset="0"/>
+                <a:ea typeface="Courier New" charset="0"/>
+                <a:cs typeface="Courier New" charset="0"/>
+              </a:rPr>
+              <a:t>Employee</a:t>
+            </a:r>
+            <a:r>
+              <a:rPr lang="de-DE" sz="1600" dirty="0">
+                <a:latin typeface="Courier New" charset="0"/>
+                <a:ea typeface="Courier New" charset="0"/>
+                <a:cs typeface="Courier New" charset="0"/>
+              </a:rPr>
+              <a:t>&gt; </a:t>
+            </a:r>
+            <a:r>
+              <a:rPr lang="de-DE" sz="1600" dirty="0" err="1">
+                <a:latin typeface="Courier New" charset="0"/>
+                <a:ea typeface="Courier New" charset="0"/>
+                <a:cs typeface="Courier New" charset="0"/>
+              </a:rPr>
+              <a:t>result</a:t>
+            </a:r>
+            <a:r>
+              <a:rPr lang="de-DE" sz="1600" dirty="0">
+                <a:latin typeface="Courier New" charset="0"/>
+                <a:ea typeface="Courier New" charset="0"/>
+                <a:cs typeface="Courier New" charset="0"/>
+              </a:rPr>
+              <a:t> = </a:t>
+            </a:r>
+            <a:r>
+              <a:rPr lang="de-DE" sz="1600" dirty="0" err="1" smtClean="0">
+                <a:latin typeface="Courier New" charset="0"/>
+                <a:ea typeface="Courier New" charset="0"/>
+                <a:cs typeface="Courier New" charset="0"/>
+              </a:rPr>
+              <a:t>q.getResultList</a:t>
+            </a:r>
+            <a:r>
+              <a:rPr lang="de-DE" sz="1600" dirty="0">
+                <a:latin typeface="Courier New" charset="0"/>
+                <a:ea typeface="Courier New" charset="0"/>
+                <a:cs typeface="Courier New" charset="0"/>
+              </a:rPr>
+              <a:t>();</a:t>
+            </a:r>
+          </a:p>
+          <a:p>
+            <a:pPr marL="685800" lvl="2" indent="0">
+              <a:spcBef>
+                <a:spcPts val="600"/>
+              </a:spcBef>
+              <a:buNone/>
+            </a:pPr>
+            <a:r>
+              <a:rPr lang="de-DE" sz="1600" dirty="0">
+                <a:latin typeface="Courier New" charset="0"/>
+                <a:ea typeface="Courier New" charset="0"/>
+                <a:cs typeface="Courier New" charset="0"/>
+              </a:rPr>
+              <a:t>// </a:t>
+            </a:r>
+            <a:r>
+              <a:rPr lang="de-DE" sz="1600" dirty="0" err="1">
+                <a:latin typeface="Courier New" charset="0"/>
+                <a:ea typeface="Courier New" charset="0"/>
+                <a:cs typeface="Courier New" charset="0"/>
+              </a:rPr>
+              <a:t>result.contains</a:t>
+            </a:r>
+            <a:r>
+              <a:rPr lang="de-DE" sz="1600" dirty="0">
+                <a:latin typeface="Courier New" charset="0"/>
+                <a:ea typeface="Courier New" charset="0"/>
+                <a:cs typeface="Courier New" charset="0"/>
+              </a:rPr>
+              <a:t>(</a:t>
+            </a:r>
+            <a:r>
+              <a:rPr lang="de-DE" sz="1600" dirty="0" err="1">
+                <a:latin typeface="Courier New" charset="0"/>
+                <a:ea typeface="Courier New" charset="0"/>
+                <a:cs typeface="Courier New" charset="0"/>
+              </a:rPr>
+              <a:t>e</a:t>
+            </a:r>
+            <a:r>
+              <a:rPr lang="de-DE" sz="1600" dirty="0" smtClean="0">
+                <a:latin typeface="Courier New" charset="0"/>
+                <a:ea typeface="Courier New" charset="0"/>
+                <a:cs typeface="Courier New" charset="0"/>
+              </a:rPr>
+              <a:t>)!</a:t>
+            </a:r>
+          </a:p>
+          <a:p>
+            <a:pPr marL="685800" lvl="2" indent="0">
+              <a:spcBef>
+                <a:spcPts val="600"/>
+              </a:spcBef>
+              <a:buNone/>
+            </a:pPr>
+            <a:endParaRPr lang="de-DE" sz="1600" dirty="0">
+              <a:latin typeface="Courier New" charset="0"/>
+              <a:ea typeface="Courier New" charset="0"/>
+              <a:cs typeface="Courier New" charset="0"/>
+            </a:endParaRPr>
           </a:p>
         </p:txBody>
       </p:sp>
@@ -7875,9 +7951,9 @@
           <a:bodyPr/>
           <a:lstStyle/>
           <a:p>
-            <a:fld id="{D39BBA4D-B856-7B40-9294-4392DE19305E}" type="datetime1">
+            <a:fld id="{08ED7225-290C-1D4B-A00D-F36093D4B0C9}" type="datetime1">
               <a:rPr lang="de-DE" smtClean="0"/>
-              <a:t>16.03.16</a:t>
+              <a:t>08.01.17</a:t>
             </a:fld>
             <a:endParaRPr lang="de-DE"/>
           </a:p>
@@ -7900,7 +7976,7 @@
           <a:p>
             <a:r>
               <a:rPr lang="de-DE" smtClean="0"/>
-              <a:t>Copyright © 2015 – akquinet AG</a:t>
+              <a:t>Copyright © 2017 – akquinet AG</a:t>
             </a:r>
             <a:endParaRPr lang="de-DE"/>
           </a:p>
@@ -7909,7 +7985,7 @@
     </p:spTree>
     <p:extLst>
       <p:ext uri="{BB962C8B-B14F-4D97-AF65-F5344CB8AC3E}">
-        <p14:creationId xmlns:p14="http://schemas.microsoft.com/office/powerpoint/2010/main" val="531553971"/>
+        <p14:creationId xmlns:p14="http://schemas.microsoft.com/office/powerpoint/2010/main" val="1191823879"/>
       </p:ext>
     </p:extLst>
   </p:cSld>
@@ -7954,7 +8030,7 @@
           <a:p>
             <a:r>
               <a:rPr lang="de-DE" dirty="0" smtClean="0"/>
-              <a:t>Sortierung</a:t>
+              <a:t>Iteration auf der DB</a:t>
             </a:r>
             <a:endParaRPr lang="de-DE" dirty="0"/>
           </a:p>
@@ -7984,23 +8060,13 @@
             <a:pPr lvl="1"/>
             <a:r>
               <a:rPr lang="de-DE" dirty="0" smtClean="0"/>
-              <a:t>Entitäten werden geladen und dann im Speicher sortiert</a:t>
-            </a:r>
-          </a:p>
-          <a:p>
-            <a:pPr lvl="1"/>
-            <a:r>
-              <a:rPr lang="de-DE" dirty="0" smtClean="0"/>
-              <a:t>=&gt; Sortierung in der DB </a:t>
-            </a:r>
-            <a:r>
-              <a:rPr lang="de-DE" dirty="0">
-                <a:ea typeface="Courier New" charset="0"/>
-                <a:cs typeface="Courier New" charset="0"/>
-              </a:rPr>
-              <a:t>meistens effizienter </a:t>
-            </a:r>
-            <a:endParaRPr lang="de-DE" dirty="0"/>
+              <a:t>Java-Schleife vs. </a:t>
+            </a:r>
+            <a:r>
+              <a:rPr lang="de-DE" smtClean="0"/>
+              <a:t>Query</a:t>
+            </a:r>
+            <a:endParaRPr lang="de-DE"/>
           </a:p>
         </p:txBody>
       </p:sp>
@@ -8043,9 +8109,9 @@
           <a:bodyPr/>
           <a:lstStyle/>
           <a:p>
-            <a:fld id="{D39BBA4D-B856-7B40-9294-4392DE19305E}" type="datetime1">
+            <a:fld id="{FA3755DB-3A15-3248-8B53-6901EF8CCFC1}" type="datetime1">
               <a:rPr lang="de-DE" smtClean="0"/>
-              <a:t>16.03.16</a:t>
+              <a:t>08.01.17</a:t>
             </a:fld>
             <a:endParaRPr lang="de-DE"/>
           </a:p>
@@ -8068,7 +8134,7 @@
           <a:p>
             <a:r>
               <a:rPr lang="de-DE" smtClean="0"/>
-              <a:t>Copyright © 2015 – akquinet AG</a:t>
+              <a:t>Copyright © 2017 – akquinet AG</a:t>
             </a:r>
             <a:endParaRPr lang="de-DE"/>
           </a:p>
@@ -8077,7 +8143,7 @@
     </p:spTree>
     <p:extLst>
       <p:ext uri="{BB962C8B-B14F-4D97-AF65-F5344CB8AC3E}">
-        <p14:creationId xmlns:p14="http://schemas.microsoft.com/office/powerpoint/2010/main" val="398350308"/>
+        <p14:creationId xmlns:p14="http://schemas.microsoft.com/office/powerpoint/2010/main" val="627049662"/>
       </p:ext>
     </p:extLst>
   </p:cSld>
@@ -8122,7 +8188,7 @@
           <a:p>
             <a:r>
               <a:rPr lang="de-DE" dirty="0" smtClean="0"/>
-              <a:t>JPQL UPDATE und Kontext</a:t>
+              <a:t>Sortierung</a:t>
             </a:r>
             <a:endParaRPr lang="de-DE" dirty="0"/>
           </a:p>
@@ -8145,32 +8211,29 @@
           <a:p>
             <a:r>
               <a:rPr lang="de-DE" dirty="0" smtClean="0"/>
-              <a:t>Problem:</a:t>
-            </a:r>
+              <a:t>Sortierung im Speicher oder in der DB?</a:t>
+            </a:r>
+            <a:endParaRPr lang="de-DE" dirty="0" smtClean="0"/>
           </a:p>
           <a:p>
             <a:pPr lvl="1"/>
             <a:r>
-              <a:rPr lang="de-DE" dirty="0" err="1" smtClean="0"/>
-              <a:t>Persistenzkontext</a:t>
-            </a:r>
-            <a:r>
               <a:rPr lang="de-DE" dirty="0" smtClean="0"/>
-              <a:t> wird bei UPDATE oder DELETE JPQL Query nicht synchronisiert</a:t>
+              <a:t>Entitäten werden geladen und dann im Speicher sortiert</a:t>
             </a:r>
           </a:p>
           <a:p>
             <a:pPr lvl="1"/>
             <a:r>
               <a:rPr lang="de-DE" dirty="0" smtClean="0"/>
-              <a:t>Cache ist veraltet</a:t>
-            </a:r>
-            <a:r>
-              <a:rPr lang="de-DE" dirty="0" smtClean="0">
+              <a:t>=&gt; Sortierung in der DB </a:t>
+            </a:r>
+            <a:r>
+              <a:rPr lang="de-DE" dirty="0">
                 <a:ea typeface="Courier New" charset="0"/>
                 <a:cs typeface="Courier New" charset="0"/>
               </a:rPr>
-              <a:t> </a:t>
+              <a:t>meistens effizienter </a:t>
             </a:r>
             <a:endParaRPr lang="de-DE" dirty="0"/>
           </a:p>
@@ -8215,9 +8278,9 @@
           <a:bodyPr/>
           <a:lstStyle/>
           <a:p>
-            <a:fld id="{D39BBA4D-B856-7B40-9294-4392DE19305E}" type="datetime1">
+            <a:fld id="{EBA03CFD-94BB-E34B-B31A-CF6AF51CD07E}" type="datetime1">
               <a:rPr lang="de-DE" smtClean="0"/>
-              <a:t>16.03.16</a:t>
+              <a:t>08.01.17</a:t>
             </a:fld>
             <a:endParaRPr lang="de-DE"/>
           </a:p>
@@ -8240,7 +8303,7 @@
           <a:p>
             <a:r>
               <a:rPr lang="de-DE" smtClean="0"/>
-              <a:t>Copyright © 2015 – akquinet AG</a:t>
+              <a:t>Copyright © 2017 – akquinet AG</a:t>
             </a:r>
             <a:endParaRPr lang="de-DE"/>
           </a:p>
@@ -8249,7 +8312,7 @@
     </p:spTree>
     <p:extLst>
       <p:ext uri="{BB962C8B-B14F-4D97-AF65-F5344CB8AC3E}">
-        <p14:creationId xmlns:p14="http://schemas.microsoft.com/office/powerpoint/2010/main" val="358451836"/>
+        <p14:creationId xmlns:p14="http://schemas.microsoft.com/office/powerpoint/2010/main" val="398350308"/>
       </p:ext>
     </p:extLst>
   </p:cSld>
@@ -8293,12 +8356,8 @@
           <a:lstStyle/>
           <a:p>
             <a:r>
-              <a:rPr lang="de-DE" dirty="0" err="1" smtClean="0"/>
-              <a:t>Merge</a:t>
-            </a:r>
-            <a:r>
               <a:rPr lang="de-DE" dirty="0" smtClean="0"/>
-              <a:t> Operation</a:t>
+              <a:t>Nachladen von assoziierten Instanzen</a:t>
             </a:r>
             <a:endParaRPr lang="de-DE" dirty="0"/>
           </a:p>
@@ -8328,16 +8387,45 @@
             <a:pPr lvl="1"/>
             <a:r>
               <a:rPr lang="de-DE" dirty="0" smtClean="0"/>
-              <a:t>Rückgabewert von </a:t>
-            </a:r>
-            <a:r>
-              <a:rPr lang="de-DE" dirty="0" err="1" smtClean="0"/>
-              <a:t>EM.merge</a:t>
-            </a:r>
+              <a:t>Listen von Entitäten </a:t>
+            </a:r>
+          </a:p>
+          <a:p>
+            <a:pPr lvl="1"/>
             <a:r>
               <a:rPr lang="de-DE" dirty="0" smtClean="0"/>
-              <a:t> wird ignoriert</a:t>
-            </a:r>
+              <a:t>Listen Ansicht zeigt Daten assoziierter Instanzen</a:t>
+            </a:r>
+          </a:p>
+          <a:p>
+            <a:pPr lvl="1"/>
+            <a:r>
+              <a:rPr lang="de-DE" dirty="0" smtClean="0"/>
+              <a:t>Eine Query holt die Listen Elemente </a:t>
+            </a:r>
+          </a:p>
+          <a:p>
+            <a:pPr lvl="1"/>
+            <a:r>
+              <a:rPr lang="de-DE" dirty="0" smtClean="0"/>
+              <a:t>Pro Element </a:t>
+            </a:r>
+            <a:r>
+              <a:rPr lang="de-DE" dirty="0"/>
+              <a:t>werden assoziierter </a:t>
+            </a:r>
+            <a:r>
+              <a:rPr lang="de-DE" dirty="0" smtClean="0"/>
+              <a:t>Instanzen geladen</a:t>
+            </a:r>
+          </a:p>
+          <a:p>
+            <a:pPr lvl="1"/>
+            <a:r>
+              <a:rPr lang="de-DE" dirty="0" smtClean="0"/>
+              <a:t>=&gt; Viele DB Zugriffe</a:t>
+            </a:r>
+            <a:endParaRPr lang="de-DE" dirty="0"/>
           </a:p>
         </p:txBody>
       </p:sp>
@@ -8380,9 +8468,9 @@
           <a:bodyPr/>
           <a:lstStyle/>
           <a:p>
-            <a:fld id="{D39BBA4D-B856-7B40-9294-4392DE19305E}" type="datetime1">
+            <a:fld id="{A56E7CC8-C9CF-8142-A8C1-5B4E1659A332}" type="datetime1">
               <a:rPr lang="de-DE" smtClean="0"/>
-              <a:t>16.03.16</a:t>
+              <a:t>08.01.17</a:t>
             </a:fld>
             <a:endParaRPr lang="de-DE"/>
           </a:p>
@@ -8405,7 +8493,7 @@
           <a:p>
             <a:r>
               <a:rPr lang="de-DE" smtClean="0"/>
-              <a:t>Copyright © 2015 – akquinet AG</a:t>
+              <a:t>Copyright © 2017 – akquinet AG</a:t>
             </a:r>
             <a:endParaRPr lang="de-DE"/>
           </a:p>
@@ -8414,7 +8502,7 @@
     </p:spTree>
     <p:extLst>
       <p:ext uri="{BB962C8B-B14F-4D97-AF65-F5344CB8AC3E}">
-        <p14:creationId xmlns:p14="http://schemas.microsoft.com/office/powerpoint/2010/main" val="1216716878"/>
+        <p14:creationId xmlns:p14="http://schemas.microsoft.com/office/powerpoint/2010/main" val="2083332961"/>
       </p:ext>
     </p:extLst>
   </p:cSld>
@@ -8459,15 +8547,399 @@
           <a:p>
             <a:r>
               <a:rPr lang="de-DE" dirty="0" err="1" smtClean="0"/>
-              <a:t>Orphan</a:t>
+              <a:t>Merge</a:t>
             </a:r>
             <a:r>
               <a:rPr lang="de-DE" dirty="0" smtClean="0"/>
               <a:t> </a:t>
             </a:r>
             <a:r>
+              <a:rPr lang="de-DE" dirty="0" smtClean="0"/>
+              <a:t>Rückgabewert</a:t>
+            </a:r>
+            <a:endParaRPr lang="de-DE" dirty="0"/>
+          </a:p>
+        </p:txBody>
+      </p:sp>
+      <p:sp>
+        <p:nvSpPr>
+          <p:cNvPr id="3" name="Inhaltsplatzhalter 2"/>
+          <p:cNvSpPr>
+            <a:spLocks noGrp="1"/>
+          </p:cNvSpPr>
+          <p:nvPr>
+            <p:ph idx="1"/>
+          </p:nvPr>
+        </p:nvSpPr>
+        <p:spPr/>
+        <p:txBody>
+          <a:bodyPr>
+            <a:normAutofit/>
+          </a:bodyPr>
+          <a:lstStyle/>
+          <a:p>
+            <a:pPr marL="1587" lvl="1" indent="0">
+              <a:buNone/>
+            </a:pPr>
+            <a:r>
+              <a:rPr lang="de-DE" b="1" dirty="0" smtClean="0"/>
+              <a:t>Rückgabewert </a:t>
+            </a:r>
+            <a:r>
+              <a:rPr lang="de-DE" b="1" dirty="0" smtClean="0"/>
+              <a:t>von </a:t>
+            </a:r>
+            <a:r>
+              <a:rPr lang="de-DE" b="1" dirty="0" err="1" smtClean="0"/>
+              <a:t>EM.merge</a:t>
+            </a:r>
+            <a:r>
+              <a:rPr lang="de-DE" b="1" dirty="0" smtClean="0"/>
+              <a:t> wird </a:t>
+            </a:r>
+            <a:r>
+              <a:rPr lang="de-DE" b="1" dirty="0" smtClean="0"/>
+              <a:t>ignoriert</a:t>
+            </a:r>
+          </a:p>
+          <a:p>
+            <a:pPr marL="685800" lvl="2" indent="0">
+              <a:spcBef>
+                <a:spcPts val="600"/>
+              </a:spcBef>
+              <a:buNone/>
+            </a:pPr>
+            <a:r>
+              <a:rPr lang="de-DE" sz="2000" dirty="0" err="1">
+                <a:latin typeface="Courier New" charset="0"/>
+                <a:ea typeface="Courier New" charset="0"/>
+                <a:cs typeface="Courier New" charset="0"/>
+              </a:rPr>
+              <a:t>em.merge</a:t>
+            </a:r>
+            <a:r>
+              <a:rPr lang="de-DE" sz="2000" dirty="0">
+                <a:latin typeface="Courier New" charset="0"/>
+                <a:ea typeface="Courier New" charset="0"/>
+                <a:cs typeface="Courier New" charset="0"/>
+              </a:rPr>
+              <a:t>(</a:t>
+            </a:r>
+            <a:r>
+              <a:rPr lang="de-DE" sz="2000" dirty="0" err="1">
+                <a:latin typeface="Courier New" charset="0"/>
+                <a:ea typeface="Courier New" charset="0"/>
+                <a:cs typeface="Courier New" charset="0"/>
+              </a:rPr>
+              <a:t>emp</a:t>
+            </a:r>
+            <a:r>
+              <a:rPr lang="de-DE" sz="2000" dirty="0">
+                <a:latin typeface="Courier New" charset="0"/>
+                <a:ea typeface="Courier New" charset="0"/>
+                <a:cs typeface="Courier New" charset="0"/>
+              </a:rPr>
+              <a:t>);</a:t>
+            </a:r>
+            <a:br>
+              <a:rPr lang="de-DE" sz="2000" dirty="0">
+                <a:latin typeface="Courier New" charset="0"/>
+                <a:ea typeface="Courier New" charset="0"/>
+                <a:cs typeface="Courier New" charset="0"/>
+              </a:rPr>
+            </a:br>
+            <a:r>
+              <a:rPr lang="de-DE" sz="2000" dirty="0" err="1">
+                <a:latin typeface="Courier New" charset="0"/>
+                <a:ea typeface="Courier New" charset="0"/>
+                <a:cs typeface="Courier New" charset="0"/>
+              </a:rPr>
+              <a:t>emp.setFirstname</a:t>
+            </a:r>
+            <a:r>
+              <a:rPr lang="de-DE" sz="2000" dirty="0">
+                <a:latin typeface="Courier New" charset="0"/>
+                <a:ea typeface="Courier New" charset="0"/>
+                <a:cs typeface="Courier New" charset="0"/>
+              </a:rPr>
+              <a:t>("New </a:t>
+            </a:r>
+            <a:r>
+              <a:rPr lang="de-DE" sz="2000" dirty="0" err="1">
+                <a:latin typeface="Courier New" charset="0"/>
+                <a:ea typeface="Courier New" charset="0"/>
+                <a:cs typeface="Courier New" charset="0"/>
+              </a:rPr>
+              <a:t>name</a:t>
+            </a:r>
+            <a:r>
+              <a:rPr lang="de-DE" sz="2000" dirty="0">
+                <a:latin typeface="Courier New" charset="0"/>
+                <a:ea typeface="Courier New" charset="0"/>
+                <a:cs typeface="Courier New" charset="0"/>
+              </a:rPr>
+              <a:t>");</a:t>
+            </a:r>
+          </a:p>
+          <a:p>
+            <a:pPr marL="1587" lvl="1" indent="0">
+              <a:buNone/>
+            </a:pPr>
+            <a:r>
+              <a:rPr lang="de-DE" b="1" dirty="0" smtClean="0"/>
+              <a:t>Besser</a:t>
+            </a:r>
+          </a:p>
+          <a:p>
+            <a:pPr marL="685800" lvl="2" indent="0">
+              <a:spcBef>
+                <a:spcPts val="600"/>
+              </a:spcBef>
+              <a:buNone/>
+            </a:pPr>
+            <a:r>
+              <a:rPr lang="de-DE" sz="2000" dirty="0" err="1" smtClean="0">
+                <a:latin typeface="Courier New" charset="0"/>
+                <a:ea typeface="Courier New" charset="0"/>
+                <a:cs typeface="Courier New" charset="0"/>
+              </a:rPr>
+              <a:t>mergedEmp</a:t>
+            </a:r>
+            <a:r>
+              <a:rPr lang="de-DE" sz="2000" dirty="0" smtClean="0">
+                <a:latin typeface="Courier New" charset="0"/>
+                <a:ea typeface="Courier New" charset="0"/>
+                <a:cs typeface="Courier New" charset="0"/>
+              </a:rPr>
+              <a:t> = </a:t>
+            </a:r>
+            <a:r>
+              <a:rPr lang="de-DE" sz="2000" dirty="0" err="1" smtClean="0">
+                <a:latin typeface="Courier New" charset="0"/>
+                <a:ea typeface="Courier New" charset="0"/>
+                <a:cs typeface="Courier New" charset="0"/>
+              </a:rPr>
+              <a:t>em.merge</a:t>
+            </a:r>
+            <a:r>
+              <a:rPr lang="de-DE" sz="2000" dirty="0" smtClean="0">
+                <a:latin typeface="Courier New" charset="0"/>
+                <a:ea typeface="Courier New" charset="0"/>
+                <a:cs typeface="Courier New" charset="0"/>
+              </a:rPr>
+              <a:t>(</a:t>
+            </a:r>
+            <a:r>
+              <a:rPr lang="de-DE" sz="2000" dirty="0" err="1" smtClean="0">
+                <a:latin typeface="Courier New" charset="0"/>
+                <a:ea typeface="Courier New" charset="0"/>
+                <a:cs typeface="Courier New" charset="0"/>
+              </a:rPr>
+              <a:t>emp</a:t>
+            </a:r>
+            <a:r>
+              <a:rPr lang="de-DE" sz="2000" dirty="0">
+                <a:latin typeface="Courier New" charset="0"/>
+                <a:ea typeface="Courier New" charset="0"/>
+                <a:cs typeface="Courier New" charset="0"/>
+              </a:rPr>
+              <a:t>);</a:t>
+            </a:r>
+            <a:br>
+              <a:rPr lang="de-DE" sz="2000" dirty="0">
+                <a:latin typeface="Courier New" charset="0"/>
+                <a:ea typeface="Courier New" charset="0"/>
+                <a:cs typeface="Courier New" charset="0"/>
+              </a:rPr>
+            </a:br>
+            <a:r>
+              <a:rPr lang="de-DE" sz="2000" dirty="0" err="1" smtClean="0">
+                <a:latin typeface="Courier New" charset="0"/>
+                <a:ea typeface="Courier New" charset="0"/>
+                <a:cs typeface="Courier New" charset="0"/>
+              </a:rPr>
+              <a:t>mergedEmp.setFirstname</a:t>
+            </a:r>
+            <a:r>
+              <a:rPr lang="de-DE" sz="2000" dirty="0">
+                <a:latin typeface="Courier New" charset="0"/>
+                <a:ea typeface="Courier New" charset="0"/>
+                <a:cs typeface="Courier New" charset="0"/>
+              </a:rPr>
+              <a:t>("New </a:t>
+            </a:r>
+            <a:r>
+              <a:rPr lang="de-DE" sz="2000" dirty="0" err="1">
+                <a:latin typeface="Courier New" charset="0"/>
+                <a:ea typeface="Courier New" charset="0"/>
+                <a:cs typeface="Courier New" charset="0"/>
+              </a:rPr>
+              <a:t>name</a:t>
+            </a:r>
+            <a:r>
+              <a:rPr lang="de-DE" sz="2000" dirty="0" smtClean="0">
+                <a:latin typeface="Courier New" charset="0"/>
+                <a:ea typeface="Courier New" charset="0"/>
+                <a:cs typeface="Courier New" charset="0"/>
+              </a:rPr>
+              <a:t>");</a:t>
+            </a:r>
+            <a:endParaRPr lang="de-DE" sz="2000" dirty="0">
+              <a:latin typeface="Courier New" charset="0"/>
+              <a:ea typeface="Courier New" charset="0"/>
+              <a:cs typeface="Courier New" charset="0"/>
+            </a:endParaRPr>
+          </a:p>
+          <a:p>
+            <a:pPr marL="685800" lvl="2" indent="0">
+              <a:spcBef>
+                <a:spcPts val="600"/>
+              </a:spcBef>
+              <a:buNone/>
+            </a:pPr>
+            <a:endParaRPr lang="de-DE" sz="2000" dirty="0">
+              <a:latin typeface="Courier New" charset="0"/>
+              <a:ea typeface="Courier New" charset="0"/>
+              <a:cs typeface="Courier New" charset="0"/>
+            </a:endParaRPr>
+          </a:p>
+        </p:txBody>
+      </p:sp>
+      <p:sp>
+        <p:nvSpPr>
+          <p:cNvPr id="4" name="Foliennummernplatzhalter 3"/>
+          <p:cNvSpPr>
+            <a:spLocks noGrp="1"/>
+          </p:cNvSpPr>
+          <p:nvPr>
+            <p:ph type="sldNum" sz="quarter" idx="4"/>
+          </p:nvPr>
+        </p:nvSpPr>
+        <p:spPr/>
+        <p:txBody>
+          <a:bodyPr/>
+          <a:lstStyle/>
+          <a:p>
+            <a:fld id="{21BAB3F4-DC41-436B-8B06-25061C82C533}" type="slidenum">
+              <a:rPr lang="de-DE" smtClean="0"/>
+              <a:pPr/>
+              <a:t>16</a:t>
+            </a:fld>
+            <a:endParaRPr lang="de-DE"/>
+          </a:p>
+        </p:txBody>
+      </p:sp>
+      <p:sp>
+        <p:nvSpPr>
+          <p:cNvPr id="5" name="Datumsplatzhalter 4"/>
+          <p:cNvSpPr>
+            <a:spLocks noGrp="1"/>
+          </p:cNvSpPr>
+          <p:nvPr>
+            <p:ph type="dt" sz="half" idx="2"/>
+          </p:nvPr>
+        </p:nvSpPr>
+        <p:spPr/>
+        <p:txBody>
+          <a:bodyPr/>
+          <a:lstStyle/>
+          <a:p>
+            <a:fld id="{72BBEFD7-CB87-F245-B46B-6B59D2499ED3}" type="datetime1">
+              <a:rPr lang="de-DE" smtClean="0"/>
+              <a:t>08.01.17</a:t>
+            </a:fld>
+            <a:endParaRPr lang="de-DE"/>
+          </a:p>
+        </p:txBody>
+      </p:sp>
+      <p:sp>
+        <p:nvSpPr>
+          <p:cNvPr id="6" name="Fußzeilenplatzhalter 5"/>
+          <p:cNvSpPr>
+            <a:spLocks noGrp="1"/>
+          </p:cNvSpPr>
+          <p:nvPr>
+            <p:ph type="ftr" sz="quarter" idx="3"/>
+          </p:nvPr>
+        </p:nvSpPr>
+        <p:spPr/>
+        <p:txBody>
+          <a:bodyPr/>
+          <a:lstStyle/>
+          <a:p>
+            <a:r>
+              <a:rPr lang="de-DE" smtClean="0"/>
+              <a:t>Copyright © 2017 – akquinet AG</a:t>
+            </a:r>
+            <a:endParaRPr lang="de-DE"/>
+          </a:p>
+        </p:txBody>
+      </p:sp>
+    </p:spTree>
+    <p:extLst>
+      <p:ext uri="{BB962C8B-B14F-4D97-AF65-F5344CB8AC3E}">
+        <p14:creationId xmlns:p14="http://schemas.microsoft.com/office/powerpoint/2010/main" val="1216716878"/>
+      </p:ext>
+    </p:extLst>
+  </p:cSld>
+  <p:clrMapOvr>
+    <a:masterClrMapping/>
+  </p:clrMapOvr>
+  <p:transition advClick="0"/>
+</p:sld>
+</file>
+
+<file path=ppt/slides/slide17.xml><?xml version="1.0" encoding="utf-8"?>
+<p:sld xmlns:a="http://schemas.openxmlformats.org/drawingml/2006/main" xmlns:r="http://schemas.openxmlformats.org/officeDocument/2006/relationships" xmlns:p="http://schemas.openxmlformats.org/presentationml/2006/main">
+  <p:cSld>
+    <p:spTree>
+      <p:nvGrpSpPr>
+        <p:cNvPr id="1" name=""/>
+        <p:cNvGrpSpPr/>
+        <p:nvPr/>
+      </p:nvGrpSpPr>
+      <p:grpSpPr>
+        <a:xfrm>
+          <a:off x="0" y="0"/>
+          <a:ext cx="0" cy="0"/>
+          <a:chOff x="0" y="0"/>
+          <a:chExt cx="0" cy="0"/>
+        </a:xfrm>
+      </p:grpSpPr>
+      <p:sp>
+        <p:nvSpPr>
+          <p:cNvPr id="2" name="Titel 1"/>
+          <p:cNvSpPr>
+            <a:spLocks noGrp="1"/>
+          </p:cNvSpPr>
+          <p:nvPr>
+            <p:ph type="title"/>
+          </p:nvPr>
+        </p:nvSpPr>
+        <p:spPr/>
+        <p:txBody>
+          <a:bodyPr/>
+          <a:lstStyle/>
+          <a:p>
+            <a:r>
               <a:rPr lang="de-DE" dirty="0" err="1" smtClean="0"/>
-              <a:t>Removal</a:t>
+              <a:t>Merge</a:t>
+            </a:r>
+            <a:r>
+              <a:rPr lang="de-DE" dirty="0" smtClean="0"/>
+              <a:t> DTO </a:t>
+            </a:r>
+            <a:r>
+              <a:rPr lang="de-DE" dirty="0" err="1"/>
+              <a:t>I</a:t>
+            </a:r>
+            <a:r>
+              <a:rPr lang="de-DE" dirty="0" err="1" smtClean="0"/>
+              <a:t>nto</a:t>
+            </a:r>
+            <a:r>
+              <a:rPr lang="de-DE" dirty="0" smtClean="0"/>
+              <a:t> Entity</a:t>
             </a:r>
             <a:endParaRPr lang="de-DE" dirty="0"/>
           </a:p>
@@ -8488,41 +8960,114 @@
           <a:bodyPr/>
           <a:lstStyle/>
           <a:p>
+            <a:pPr marL="1587" lvl="1" indent="0">
+              <a:buNone/>
+            </a:pPr>
+            <a:r>
+              <a:rPr lang="de-DE" b="1" dirty="0" smtClean="0"/>
+              <a:t>JPA Instanz auf Basis der Werte eines DTO erzeugen </a:t>
+            </a:r>
+          </a:p>
+          <a:p>
+            <a:pPr lvl="1"/>
             <a:r>
               <a:rPr lang="de-DE" dirty="0" smtClean="0"/>
-              <a:t>Problem:</a:t>
+              <a:t>Neue JPA Instanz mit </a:t>
+            </a:r>
+            <a:r>
+              <a:rPr lang="de-DE" dirty="0" err="1" smtClean="0"/>
+              <a:t>new</a:t>
+            </a:r>
+            <a:r>
+              <a:rPr lang="de-DE" dirty="0" smtClean="0"/>
+              <a:t> erzeugen</a:t>
             </a:r>
           </a:p>
           <a:p>
             <a:pPr lvl="1"/>
             <a:r>
               <a:rPr lang="de-DE" dirty="0" smtClean="0"/>
-              <a:t>Welche </a:t>
+              <a:t>DTO </a:t>
+            </a:r>
+            <a:r>
+              <a:rPr lang="de-DE" dirty="0"/>
+              <a:t>F</a:t>
+            </a:r>
+            <a:r>
+              <a:rPr lang="de-DE" dirty="0" smtClean="0"/>
+              <a:t>elder (inkl. </a:t>
             </a:r>
             <a:r>
               <a:rPr lang="de-DE" dirty="0" err="1" smtClean="0"/>
-              <a:t>Relationship</a:t>
+              <a:t>Id</a:t>
             </a:r>
             <a:r>
               <a:rPr lang="de-DE" dirty="0" smtClean="0"/>
-              <a:t> Operation löst </a:t>
+              <a:t>) kopieren und </a:t>
             </a:r>
             <a:r>
               <a:rPr lang="de-DE" dirty="0" err="1" smtClean="0"/>
-              <a:t>orphan</a:t>
+              <a:t>em.merge</a:t>
             </a:r>
             <a:r>
               <a:rPr lang="de-DE" dirty="0" smtClean="0"/>
-              <a:t> </a:t>
+              <a:t> aufrufen</a:t>
+            </a:r>
+          </a:p>
+          <a:p>
+            <a:pPr lvl="1"/>
+            <a:r>
+              <a:rPr lang="de-DE" dirty="0" smtClean="0"/>
+              <a:t>Problem: DTO beinhaltet nicht alle </a:t>
+            </a:r>
+            <a:r>
+              <a:rPr lang="de-DE" dirty="0" err="1"/>
+              <a:t>R</a:t>
             </a:r>
             <a:r>
               <a:rPr lang="de-DE" dirty="0" err="1" smtClean="0"/>
-              <a:t>removal</a:t>
+              <a:t>elationships</a:t>
+            </a:r>
+            <a:endParaRPr lang="de-DE" dirty="0" smtClean="0"/>
+          </a:p>
+          <a:p>
+            <a:pPr marL="1587" lvl="1" indent="0">
+              <a:buNone/>
+            </a:pPr>
+            <a:r>
+              <a:rPr lang="de-DE" b="1" dirty="0" smtClean="0">
+                <a:ea typeface="+mn-ea"/>
+              </a:rPr>
+              <a:t>Besser</a:t>
+            </a:r>
+            <a:endParaRPr lang="de-DE" dirty="0" smtClean="0"/>
+          </a:p>
+          <a:p>
+            <a:pPr lvl="1"/>
+            <a:r>
+              <a:rPr lang="de-DE" dirty="0" err="1" smtClean="0"/>
+              <a:t>em.find</a:t>
             </a:r>
             <a:r>
               <a:rPr lang="de-DE" dirty="0" smtClean="0"/>
-              <a:t> aus</a:t>
-            </a:r>
+              <a:t>(</a:t>
+            </a:r>
+            <a:r>
+              <a:rPr lang="de-DE" dirty="0" err="1" smtClean="0"/>
+              <a:t>id</a:t>
+            </a:r>
+            <a:r>
+              <a:rPr lang="de-DE" dirty="0" smtClean="0"/>
+              <a:t>) aufrufen und die Felder kopieren</a:t>
+            </a:r>
+          </a:p>
+          <a:p>
+            <a:pPr lvl="1"/>
+            <a:r>
+              <a:rPr lang="de-DE" dirty="0" smtClean="0"/>
+              <a:t>Schwierig zu generieren</a:t>
+            </a:r>
+            <a:endParaRPr lang="de-DE" dirty="0" smtClean="0"/>
           </a:p>
         </p:txBody>
       </p:sp>
@@ -8544,7 +9089,7 @@
             <a:fld id="{21BAB3F4-DC41-436B-8B06-25061C82C533}" type="slidenum">
               <a:rPr lang="de-DE" smtClean="0"/>
               <a:pPr/>
-              <a:t>16</a:t>
+              <a:t>17</a:t>
             </a:fld>
             <a:endParaRPr lang="de-DE"/>
           </a:p>
@@ -8565,9 +9110,9 @@
           <a:bodyPr/>
           <a:lstStyle/>
           <a:p>
-            <a:fld id="{D39BBA4D-B856-7B40-9294-4392DE19305E}" type="datetime1">
+            <a:fld id="{0DE1AD2E-1A24-3A40-9366-C084BD9E2DDA}" type="datetime1">
               <a:rPr lang="de-DE" smtClean="0"/>
-              <a:t>16.03.16</a:t>
+              <a:t>08.01.17</a:t>
             </a:fld>
             <a:endParaRPr lang="de-DE"/>
           </a:p>
@@ -8590,7 +9135,7 @@
           <a:p>
             <a:r>
               <a:rPr lang="de-DE" smtClean="0"/>
-              <a:t>Copyright © 2015 – akquinet AG</a:t>
+              <a:t>Copyright © 2017 – akquinet AG</a:t>
             </a:r>
             <a:endParaRPr lang="de-DE"/>
           </a:p>
@@ -8599,7 +9144,168 @@
     </p:spTree>
     <p:extLst>
       <p:ext uri="{BB962C8B-B14F-4D97-AF65-F5344CB8AC3E}">
-        <p14:creationId xmlns:p14="http://schemas.microsoft.com/office/powerpoint/2010/main" val="818247314"/>
+        <p14:creationId xmlns:p14="http://schemas.microsoft.com/office/powerpoint/2010/main" val="889174193"/>
+      </p:ext>
+    </p:extLst>
+  </p:cSld>
+  <p:clrMapOvr>
+    <a:masterClrMapping/>
+  </p:clrMapOvr>
+  <p:transition advClick="0"/>
+</p:sld>
+</file>
+
+<file path=ppt/slides/slide18.xml><?xml version="1.0" encoding="utf-8"?>
+<p:sld xmlns:a="http://schemas.openxmlformats.org/drawingml/2006/main" xmlns:r="http://schemas.openxmlformats.org/officeDocument/2006/relationships" xmlns:p="http://schemas.openxmlformats.org/presentationml/2006/main">
+  <p:cSld>
+    <p:spTree>
+      <p:nvGrpSpPr>
+        <p:cNvPr id="1" name=""/>
+        <p:cNvGrpSpPr/>
+        <p:nvPr/>
+      </p:nvGrpSpPr>
+      <p:grpSpPr>
+        <a:xfrm>
+          <a:off x="0" y="0"/>
+          <a:ext cx="0" cy="0"/>
+          <a:chOff x="0" y="0"/>
+          <a:chExt cx="0" cy="0"/>
+        </a:xfrm>
+      </p:grpSpPr>
+      <p:sp>
+        <p:nvSpPr>
+          <p:cNvPr id="2" name="Titel 1"/>
+          <p:cNvSpPr>
+            <a:spLocks noGrp="1"/>
+          </p:cNvSpPr>
+          <p:nvPr>
+            <p:ph type="title"/>
+          </p:nvPr>
+        </p:nvSpPr>
+        <p:spPr/>
+        <p:txBody>
+          <a:bodyPr/>
+          <a:lstStyle/>
+          <a:p>
+            <a:r>
+              <a:rPr lang="de-DE" dirty="0" smtClean="0"/>
+              <a:t>Nutzung von Assoziationen in JPQL</a:t>
+            </a:r>
+            <a:endParaRPr lang="de-DE" dirty="0"/>
+          </a:p>
+        </p:txBody>
+      </p:sp>
+      <p:sp>
+        <p:nvSpPr>
+          <p:cNvPr id="3" name="Inhaltsplatzhalter 2"/>
+          <p:cNvSpPr>
+            <a:spLocks noGrp="1"/>
+          </p:cNvSpPr>
+          <p:nvPr>
+            <p:ph idx="1"/>
+          </p:nvPr>
+        </p:nvSpPr>
+        <p:spPr/>
+        <p:txBody>
+          <a:bodyPr/>
+          <a:lstStyle/>
+          <a:p>
+            <a:r>
+              <a:rPr lang="de-DE" dirty="0" smtClean="0"/>
+              <a:t>Problem:</a:t>
+            </a:r>
+          </a:p>
+          <a:p>
+            <a:pPr lvl="1"/>
+            <a:r>
+              <a:rPr lang="de-DE" dirty="0" smtClean="0"/>
+              <a:t>Jeder Pfad Ausdruck führt zu einem </a:t>
+            </a:r>
+            <a:r>
+              <a:rPr lang="de-DE" dirty="0" err="1" smtClean="0"/>
+              <a:t>Join</a:t>
+            </a:r>
+            <a:r>
+              <a:rPr lang="de-DE" dirty="0" smtClean="0"/>
+              <a:t> </a:t>
+            </a:r>
+          </a:p>
+        </p:txBody>
+      </p:sp>
+      <p:sp>
+        <p:nvSpPr>
+          <p:cNvPr id="4" name="Foliennummernplatzhalter 3"/>
+          <p:cNvSpPr>
+            <a:spLocks noGrp="1"/>
+          </p:cNvSpPr>
+          <p:nvPr>
+            <p:ph type="sldNum" sz="quarter" idx="4"/>
+          </p:nvPr>
+        </p:nvSpPr>
+        <p:spPr/>
+        <p:txBody>
+          <a:bodyPr/>
+          <a:lstStyle/>
+          <a:p>
+            <a:fld id="{21BAB3F4-DC41-436B-8B06-25061C82C533}" type="slidenum">
+              <a:rPr lang="de-DE" smtClean="0"/>
+              <a:pPr/>
+              <a:t>18</a:t>
+            </a:fld>
+            <a:endParaRPr lang="de-DE"/>
+          </a:p>
+        </p:txBody>
+      </p:sp>
+      <p:sp>
+        <p:nvSpPr>
+          <p:cNvPr id="5" name="Datumsplatzhalter 4"/>
+          <p:cNvSpPr>
+            <a:spLocks noGrp="1"/>
+          </p:cNvSpPr>
+          <p:nvPr>
+            <p:ph type="dt" sz="half" idx="2"/>
+          </p:nvPr>
+        </p:nvSpPr>
+        <p:spPr/>
+        <p:txBody>
+          <a:bodyPr/>
+          <a:lstStyle/>
+          <a:p>
+            <a:fld id="{9C30B2D2-8E82-CB4D-9F96-067287813C01}" type="datetime1">
+              <a:rPr lang="de-DE" smtClean="0"/>
+              <a:t>08.01.17</a:t>
+            </a:fld>
+            <a:endParaRPr lang="de-DE"/>
+          </a:p>
+        </p:txBody>
+      </p:sp>
+      <p:sp>
+        <p:nvSpPr>
+          <p:cNvPr id="6" name="Fußzeilenplatzhalter 5"/>
+          <p:cNvSpPr>
+            <a:spLocks noGrp="1"/>
+          </p:cNvSpPr>
+          <p:nvPr>
+            <p:ph type="ftr" sz="quarter" idx="3"/>
+          </p:nvPr>
+        </p:nvSpPr>
+        <p:spPr/>
+        <p:txBody>
+          <a:bodyPr/>
+          <a:lstStyle/>
+          <a:p>
+            <a:r>
+              <a:rPr lang="de-DE" smtClean="0"/>
+              <a:t>Copyright © 2017 – akquinet AG</a:t>
+            </a:r>
+            <a:endParaRPr lang="de-DE"/>
+          </a:p>
+        </p:txBody>
+      </p:sp>
+    </p:spTree>
+    <p:extLst>
+      <p:ext uri="{BB962C8B-B14F-4D97-AF65-F5344CB8AC3E}">
+        <p14:creationId xmlns:p14="http://schemas.microsoft.com/office/powerpoint/2010/main" val="274586365"/>
       </p:ext>
     </p:extLst>
   </p:cSld>
@@ -8748,9 +9454,9 @@
           <a:bodyPr/>
           <a:lstStyle/>
           <a:p>
-            <a:fld id="{D39BBA4D-B856-7B40-9294-4392DE19305E}" type="datetime1">
+            <a:fld id="{4BEBCBD9-FF91-1D44-80A3-F726896079A4}" type="datetime1">
               <a:rPr lang="de-DE" smtClean="0"/>
-              <a:t>16.03.16</a:t>
+              <a:t>08.01.17</a:t>
             </a:fld>
             <a:endParaRPr lang="de-DE"/>
           </a:p>
@@ -8773,7 +9479,7 @@
           <a:p>
             <a:r>
               <a:rPr lang="de-DE" smtClean="0"/>
-              <a:t>Copyright © 2015 – akquinet AG</a:t>
+              <a:t>Copyright © 2017 – akquinet AG</a:t>
             </a:r>
             <a:endParaRPr lang="de-DE"/>
           </a:p>
@@ -8909,9 +9615,9 @@
           <a:bodyPr/>
           <a:lstStyle/>
           <a:p>
-            <a:fld id="{D39BBA4D-B856-7B40-9294-4392DE19305E}" type="datetime1">
+            <a:fld id="{62C6873C-8111-7F45-A7BE-933B4DE2F40D}" type="datetime1">
               <a:rPr lang="de-DE" smtClean="0"/>
-              <a:t>16.03.16</a:t>
+              <a:t>08.01.17</a:t>
             </a:fld>
             <a:endParaRPr lang="de-DE"/>
           </a:p>
@@ -8934,7 +9640,7 @@
           <a:p>
             <a:r>
               <a:rPr lang="de-DE" smtClean="0"/>
-              <a:t>Copyright © 2015 – akquinet AG</a:t>
+              <a:t>Copyright © 2017 – akquinet AG</a:t>
             </a:r>
             <a:endParaRPr lang="de-DE"/>
           </a:p>
@@ -8987,8 +9693,16 @@
           <a:lstStyle/>
           <a:p>
             <a:r>
+              <a:rPr lang="de-DE" dirty="0" err="1" smtClean="0"/>
+              <a:t>Cascade</a:t>
+            </a:r>
+            <a:r>
               <a:rPr lang="de-DE" dirty="0" smtClean="0"/>
-              <a:t>Iteration auf der DB</a:t>
+              <a:t> </a:t>
+            </a:r>
+            <a:r>
+              <a:rPr lang="de-DE" dirty="0" err="1" smtClean="0"/>
+              <a:t>persist</a:t>
             </a:r>
             <a:endParaRPr lang="de-DE" dirty="0"/>
           </a:p>
@@ -9017,14 +9731,34 @@
           <a:p>
             <a:pPr lvl="1"/>
             <a:r>
-              <a:rPr lang="de-DE" dirty="0" smtClean="0"/>
-              <a:t>Java-Schleife vs. </a:t>
-            </a:r>
-            <a:r>
-              <a:rPr lang="de-DE" smtClean="0"/>
-              <a:t>Query</a:t>
-            </a:r>
-            <a:endParaRPr lang="de-DE"/>
+              <a:rPr lang="de-DE" dirty="0" err="1"/>
+              <a:t>Reachabiliy</a:t>
+            </a:r>
+            <a:r>
+              <a:rPr lang="de-DE" dirty="0"/>
+              <a:t> </a:t>
+            </a:r>
+            <a:r>
+              <a:rPr lang="de-DE" dirty="0" err="1"/>
+              <a:t>with</a:t>
+            </a:r>
+            <a:r>
+              <a:rPr lang="de-DE" dirty="0"/>
+              <a:t> </a:t>
+            </a:r>
+            <a:r>
+              <a:rPr lang="de-DE" dirty="0" err="1"/>
+              <a:t>cascade</a:t>
+            </a:r>
+            <a:r>
+              <a:rPr lang="de-DE" dirty="0"/>
+              <a:t>=</a:t>
+            </a:r>
+            <a:r>
+              <a:rPr lang="de-DE" dirty="0" err="1"/>
+              <a:t>persist</a:t>
+            </a:r>
+            <a:endParaRPr lang="de-DE" dirty="0" smtClean="0"/>
           </a:p>
         </p:txBody>
       </p:sp>
@@ -9067,9 +9801,9 @@
           <a:bodyPr/>
           <a:lstStyle/>
           <a:p>
-            <a:fld id="{D39BBA4D-B856-7B40-9294-4392DE19305E}" type="datetime1">
+            <a:fld id="{CE4A19BA-41E2-C042-8713-45BADC4EE82A}" type="datetime1">
               <a:rPr lang="de-DE" smtClean="0"/>
-              <a:t>16.03.16</a:t>
+              <a:t>08.01.17</a:t>
             </a:fld>
             <a:endParaRPr lang="de-DE"/>
           </a:p>
@@ -9092,7 +9826,7 @@
           <a:p>
             <a:r>
               <a:rPr lang="de-DE" smtClean="0"/>
-              <a:t>Copyright © 2015 – akquinet AG</a:t>
+              <a:t>Copyright © 2017 – akquinet AG</a:t>
             </a:r>
             <a:endParaRPr lang="de-DE"/>
           </a:p>
@@ -9101,7 +9835,7 @@
     </p:spTree>
     <p:extLst>
       <p:ext uri="{BB962C8B-B14F-4D97-AF65-F5344CB8AC3E}">
-        <p14:creationId xmlns:p14="http://schemas.microsoft.com/office/powerpoint/2010/main" val="627049662"/>
+        <p14:creationId xmlns:p14="http://schemas.microsoft.com/office/powerpoint/2010/main" val="818247314"/>
       </p:ext>
     </p:extLst>
   </p:cSld>
@@ -9145,8 +9879,8 @@
           <a:lstStyle/>
           <a:p>
             <a:r>
-              <a:rPr lang="de-DE" dirty="0" smtClean="0"/>
-              <a:t>Nachladen von assoziierten Instanzen</a:t>
+              <a:rPr lang="de-DE" dirty="0" err="1" smtClean="0"/>
+              <a:t>Owner</a:t>
             </a:r>
             <a:endParaRPr lang="de-DE" dirty="0"/>
           </a:p>
@@ -9175,46 +9909,90 @@
           <a:p>
             <a:pPr lvl="1"/>
             <a:r>
-              <a:rPr lang="de-DE" dirty="0" smtClean="0"/>
-              <a:t>Listen von Entitäten </a:t>
-            </a:r>
-          </a:p>
-          <a:p>
-            <a:pPr lvl="1"/>
-            <a:r>
-              <a:rPr lang="de-DE" dirty="0" smtClean="0"/>
-              <a:t>Listen Ansicht zeigt Daten assoziierter Instanzen</a:t>
-            </a:r>
-          </a:p>
-          <a:p>
-            <a:pPr lvl="1"/>
-            <a:r>
-              <a:rPr lang="de-DE" dirty="0" smtClean="0"/>
-              <a:t>Eine Query holt die Listen Elemente </a:t>
-            </a:r>
-          </a:p>
-          <a:p>
-            <a:pPr lvl="1"/>
-            <a:r>
-              <a:rPr lang="de-DE" dirty="0" smtClean="0"/>
-              <a:t>Pro Element </a:t>
+              <a:rPr lang="de-DE" dirty="0" err="1"/>
+              <a:t>Bidirectional</a:t>
             </a:r>
             <a:r>
               <a:rPr lang="de-DE" dirty="0"/>
-              <a:t>werden assoziierter </a:t>
-            </a:r>
-            <a:r>
-              <a:rPr lang="de-DE" dirty="0" smtClean="0"/>
-              <a:t>Instanzen geladen</a:t>
-            </a:r>
-          </a:p>
-          <a:p>
-            <a:pPr lvl="1"/>
-            <a:r>
-              <a:rPr lang="de-DE" dirty="0" smtClean="0"/>
-              <a:t>=&gt; Viele DB Zugriffe</a:t>
-            </a:r>
-            <a:endParaRPr lang="de-DE" dirty="0"/>
+              <a:t> </a:t>
+            </a:r>
+            <a:r>
+              <a:rPr lang="de-DE" dirty="0" err="1"/>
+              <a:t>relationships</a:t>
+            </a:r>
+            <a:r>
+              <a:rPr lang="de-DE" dirty="0"/>
+              <a:t> will </a:t>
+            </a:r>
+            <a:r>
+              <a:rPr lang="de-DE" dirty="0" err="1"/>
+              <a:t>be</a:t>
+            </a:r>
+            <a:r>
+              <a:rPr lang="de-DE" dirty="0"/>
+              <a:t> </a:t>
+            </a:r>
+            <a:r>
+              <a:rPr lang="de-DE" dirty="0" err="1"/>
+              <a:t>persisted</a:t>
+            </a:r>
+            <a:r>
+              <a:rPr lang="de-DE" dirty="0"/>
+              <a:t> </a:t>
+            </a:r>
+            <a:r>
+              <a:rPr lang="de-DE" dirty="0" err="1"/>
+              <a:t>based</a:t>
+            </a:r>
+            <a:r>
+              <a:rPr lang="de-DE" dirty="0"/>
+              <a:t> on </a:t>
+            </a:r>
+            <a:r>
+              <a:rPr lang="de-DE" dirty="0" err="1"/>
+              <a:t>the</a:t>
+            </a:r>
+            <a:r>
+              <a:rPr lang="de-DE" dirty="0"/>
+              <a:t> </a:t>
+            </a:r>
+            <a:r>
+              <a:rPr lang="de-DE" dirty="0" err="1"/>
+              <a:t>owning</a:t>
+            </a:r>
+            <a:r>
+              <a:rPr lang="de-DE" dirty="0"/>
+              <a:t> </a:t>
+            </a:r>
+            <a:r>
+              <a:rPr lang="de-DE" dirty="0" err="1"/>
+              <a:t>side</a:t>
+            </a:r>
+            <a:r>
+              <a:rPr lang="de-DE" dirty="0"/>
+              <a:t> </a:t>
+            </a:r>
+            <a:r>
+              <a:rPr lang="de-DE" dirty="0" err="1"/>
+              <a:t>of</a:t>
+            </a:r>
+            <a:r>
+              <a:rPr lang="de-DE" dirty="0"/>
+              <a:t> </a:t>
+            </a:r>
+            <a:r>
+              <a:rPr lang="de-DE" dirty="0" err="1"/>
+              <a:t>the</a:t>
+            </a:r>
+            <a:r>
+              <a:rPr lang="de-DE" dirty="0"/>
+              <a:t> </a:t>
+            </a:r>
+            <a:r>
+              <a:rPr lang="de-DE" dirty="0" err="1"/>
+              <a:t>relationship</a:t>
+            </a:r>
+            <a:endParaRPr lang="de-DE" dirty="0" smtClean="0"/>
           </a:p>
         </p:txBody>
       </p:sp>
@@ -9257,9 +10035,9 @@
           <a:bodyPr/>
           <a:lstStyle/>
           <a:p>
-            <a:fld id="{D39BBA4D-B856-7B40-9294-4392DE19305E}" type="datetime1">
+            <a:fld id="{C266EE62-481F-2F48-8D5C-A71639B4BBF5}" type="datetime1">
               <a:rPr lang="de-DE" smtClean="0"/>
-              <a:t>16.03.16</a:t>
+              <a:t>08.01.17</a:t>
             </a:fld>
             <a:endParaRPr lang="de-DE"/>
           </a:p>
@@ -9282,7 +10060,7 @@
           <a:p>
             <a:r>
               <a:rPr lang="de-DE" smtClean="0"/>
-              <a:t>Copyright © 2015 – akquinet AG</a:t>
+              <a:t>Copyright © 2017 – akquinet AG</a:t>
             </a:r>
             <a:endParaRPr lang="de-DE"/>
           </a:p>
@@ -9291,7 +10069,7 @@
     </p:spTree>
     <p:extLst>
       <p:ext uri="{BB962C8B-B14F-4D97-AF65-F5344CB8AC3E}">
-        <p14:creationId xmlns:p14="http://schemas.microsoft.com/office/powerpoint/2010/main" val="2083332961"/>
+        <p14:creationId xmlns:p14="http://schemas.microsoft.com/office/powerpoint/2010/main" val="1275688606"/>
       </p:ext>
     </p:extLst>
   </p:cSld>
@@ -9336,7 +10114,7 @@
           <a:p>
             <a:r>
               <a:rPr lang="de-DE" dirty="0" smtClean="0"/>
-              <a:t>Nutzung von Assoziationen in JPQL</a:t>
+              <a:t>Mapping von Vererbung (1)</a:t>
             </a:r>
             <a:endParaRPr lang="de-DE" dirty="0"/>
           </a:p>
@@ -9366,16 +10144,31 @@
             <a:pPr lvl="1"/>
             <a:r>
               <a:rPr lang="de-DE" dirty="0" smtClean="0"/>
-              <a:t>Jeder Pfad Ausdruck führt zu einem </a:t>
+              <a:t>Normalisierung auf der Datenbank </a:t>
+            </a:r>
+          </a:p>
+          <a:p>
+            <a:pPr lvl="1"/>
+            <a:r>
+              <a:rPr lang="de-DE" dirty="0" smtClean="0"/>
+              <a:t>JPA Vererbungs-Strategie: JOINED</a:t>
+            </a:r>
+          </a:p>
+          <a:p>
+            <a:pPr lvl="1"/>
+            <a:r>
+              <a:rPr lang="de-DE" dirty="0" smtClean="0"/>
+              <a:t>=&gt; Viele </a:t>
             </a:r>
             <a:r>
               <a:rPr lang="de-DE" dirty="0" err="1" smtClean="0"/>
-              <a:t>Join</a:t>
+              <a:t>Joins</a:t>
             </a:r>
             <a:r>
               <a:rPr lang="de-DE" dirty="0" smtClean="0"/>
-              <a:t> </a:t>
-            </a:r>
+              <a:t> beim Laden von Instanzen</a:t>
+            </a:r>
+            <a:endParaRPr lang="de-DE" dirty="0"/>
           </a:p>
         </p:txBody>
       </p:sp>
@@ -9418,9 +10211,9 @@
           <a:bodyPr/>
           <a:lstStyle/>
           <a:p>
-            <a:fld id="{D39BBA4D-B856-7B40-9294-4392DE19305E}" type="datetime1">
+            <a:fld id="{6BCCCC64-9CD8-E04D-BADD-1EDEE83CAAAB}" type="datetime1">
               <a:rPr lang="de-DE" smtClean="0"/>
-              <a:t>16.03.16</a:t>
+              <a:t>08.01.17</a:t>
             </a:fld>
             <a:endParaRPr lang="de-DE"/>
           </a:p>
@@ -9443,7 +10236,7 @@
           <a:p>
             <a:r>
               <a:rPr lang="de-DE" smtClean="0"/>
-              <a:t>Copyright © 2015 – akquinet AG</a:t>
+              <a:t>Copyright © 2017 – akquinet AG</a:t>
             </a:r>
             <a:endParaRPr lang="de-DE"/>
           </a:p>
@@ -9452,7 +10245,7 @@
     </p:spTree>
     <p:extLst>
       <p:ext uri="{BB962C8B-B14F-4D97-AF65-F5344CB8AC3E}">
-        <p14:creationId xmlns:p14="http://schemas.microsoft.com/office/powerpoint/2010/main" val="274586365"/>
+        <p14:creationId xmlns:p14="http://schemas.microsoft.com/office/powerpoint/2010/main" val="2065355096"/>
       </p:ext>
     </p:extLst>
   </p:cSld>
@@ -9497,7 +10290,7 @@
           <a:p>
             <a:r>
               <a:rPr lang="de-DE" dirty="0" smtClean="0"/>
-              <a:t>Duplikate im Query Ergebnis</a:t>
+              <a:t>Mapping von Vererbung (2)</a:t>
             </a:r>
             <a:endParaRPr lang="de-DE" dirty="0"/>
           </a:p>
@@ -9527,116 +10320,45 @@
             <a:pPr lvl="1"/>
             <a:r>
               <a:rPr lang="de-DE" dirty="0" smtClean="0"/>
-              <a:t>Wegen eines </a:t>
+              <a:t>Jede Subklasse hat eigene Tabelle </a:t>
+            </a:r>
+          </a:p>
+          <a:p>
+            <a:pPr lvl="1"/>
+            <a:r>
+              <a:rPr lang="de-DE" dirty="0" smtClean="0"/>
+              <a:t>JPA Vererbungs-Strategie: TABLE_PER_CLASS</a:t>
+            </a:r>
+          </a:p>
+          <a:p>
+            <a:pPr lvl="1"/>
+            <a:r>
+              <a:rPr lang="de-DE" dirty="0" smtClean="0"/>
+              <a:t>Nutzung von Assoziationen</a:t>
+            </a:r>
+          </a:p>
+          <a:p>
+            <a:pPr lvl="1"/>
+            <a:r>
+              <a:rPr lang="de-DE" dirty="0" smtClean="0"/>
+              <a:t>=&gt; SQL UNION bei </a:t>
             </a:r>
             <a:r>
               <a:rPr lang="de-DE" dirty="0" err="1" smtClean="0"/>
-              <a:t>Joins</a:t>
+              <a:t>Queries</a:t>
             </a:r>
             <a:r>
               <a:rPr lang="de-DE" dirty="0" smtClean="0"/>
-              <a:t> </a:t>
-            </a:r>
+              <a:t> über Superklasse</a:t>
+            </a:r>
+          </a:p>
+          <a:p>
+            <a:pPr lvl="1"/>
             <a:r>
               <a:rPr lang="de-DE" dirty="0" smtClean="0"/>
-              <a:t>Duplikate im Query Ergebnis:</a:t>
-            </a:r>
-          </a:p>
-          <a:p>
-            <a:pPr marL="268287" lvl="2" indent="0">
-              <a:buNone/>
-            </a:pPr>
-            <a:r>
-              <a:rPr lang="de-DE" dirty="0">
-                <a:latin typeface="Courier New" charset="0"/>
-                <a:ea typeface="Courier New" charset="0"/>
-                <a:cs typeface="Courier New" charset="0"/>
-              </a:rPr>
-              <a:t>SELECT d FROM Department d JOIN </a:t>
-            </a:r>
-            <a:r>
-              <a:rPr lang="de-DE" dirty="0" err="1">
-                <a:latin typeface="Courier New" charset="0"/>
-                <a:ea typeface="Courier New" charset="0"/>
-                <a:cs typeface="Courier New" charset="0"/>
-              </a:rPr>
-              <a:t>d.employees</a:t>
-            </a:r>
-            <a:r>
-              <a:rPr lang="de-DE" dirty="0">
-                <a:latin typeface="Courier New" charset="0"/>
-                <a:ea typeface="Courier New" charset="0"/>
-                <a:cs typeface="Courier New" charset="0"/>
-              </a:rPr>
-              <a:t> </a:t>
-            </a:r>
-            <a:r>
-              <a:rPr lang="de-DE" dirty="0" err="1">
-                <a:latin typeface="Courier New" charset="0"/>
-                <a:ea typeface="Courier New" charset="0"/>
-                <a:cs typeface="Courier New" charset="0"/>
-              </a:rPr>
-              <a:t>e</a:t>
-            </a:r>
-            <a:r>
-              <a:rPr lang="de-DE" dirty="0">
-                <a:latin typeface="Courier New" charset="0"/>
-                <a:ea typeface="Courier New" charset="0"/>
-                <a:cs typeface="Courier New" charset="0"/>
-              </a:rPr>
-              <a:t/>
-            </a:r>
-            <a:br>
-              <a:rPr lang="de-DE" dirty="0">
-                <a:latin typeface="Courier New" charset="0"/>
-                <a:ea typeface="Courier New" charset="0"/>
-                <a:cs typeface="Courier New" charset="0"/>
-              </a:rPr>
-            </a:br>
-            <a:r>
-              <a:rPr lang="de-DE" dirty="0">
-                <a:latin typeface="Courier New" charset="0"/>
-                <a:ea typeface="Courier New" charset="0"/>
-                <a:cs typeface="Courier New" charset="0"/>
-              </a:rPr>
-              <a:t>WHERE </a:t>
-            </a:r>
-            <a:r>
-              <a:rPr lang="de-DE" dirty="0" err="1">
-                <a:latin typeface="Courier New" charset="0"/>
-                <a:ea typeface="Courier New" charset="0"/>
-                <a:cs typeface="Courier New" charset="0"/>
-              </a:rPr>
-              <a:t>e.salary</a:t>
-            </a:r>
-            <a:r>
-              <a:rPr lang="de-DE" dirty="0">
-                <a:latin typeface="Courier New" charset="0"/>
-                <a:ea typeface="Courier New" charset="0"/>
-                <a:cs typeface="Courier New" charset="0"/>
-              </a:rPr>
-              <a:t> &gt; </a:t>
-            </a:r>
-            <a:r>
-              <a:rPr lang="de-DE" dirty="0" smtClean="0">
-                <a:latin typeface="Courier New" charset="0"/>
-                <a:ea typeface="Courier New" charset="0"/>
-                <a:cs typeface="Courier New" charset="0"/>
-              </a:rPr>
-              <a:t>1000.0d</a:t>
-            </a:r>
-          </a:p>
-          <a:p>
-            <a:pPr marL="344487" lvl="1" indent="-342900"/>
-            <a:r>
-              <a:rPr lang="de-DE" dirty="0" smtClean="0"/>
-              <a:t>=&gt; DISTINCT</a:t>
+              <a:t>=&gt; Navigation schwierig</a:t>
             </a:r>
             <a:endParaRPr lang="de-DE" dirty="0"/>
-          </a:p>
-          <a:p>
-            <a:pPr lvl="1"/>
-            <a:endParaRPr lang="de-DE" dirty="0" smtClean="0"/>
           </a:p>
         </p:txBody>
       </p:sp>
@@ -9679,9 +10401,9 @@
           <a:bodyPr/>
           <a:lstStyle/>
           <a:p>
-            <a:fld id="{D39BBA4D-B856-7B40-9294-4392DE19305E}" type="datetime1">
+            <a:fld id="{47DA42F9-2F5E-A94D-8018-6CC78E4F8339}" type="datetime1">
               <a:rPr lang="de-DE" smtClean="0"/>
-              <a:t>16.03.16</a:t>
+              <a:t>08.01.17</a:t>
             </a:fld>
             <a:endParaRPr lang="de-DE"/>
           </a:p>
@@ -9704,7 +10426,7 @@
           <a:p>
             <a:r>
               <a:rPr lang="de-DE" smtClean="0"/>
-              <a:t>Copyright © 2015 – akquinet AG</a:t>
+              <a:t>Copyright © 2017 – akquinet AG</a:t>
             </a:r>
             <a:endParaRPr lang="de-DE"/>
           </a:p>
@@ -9713,7 +10435,7 @@
     </p:spTree>
     <p:extLst>
       <p:ext uri="{BB962C8B-B14F-4D97-AF65-F5344CB8AC3E}">
-        <p14:creationId xmlns:p14="http://schemas.microsoft.com/office/powerpoint/2010/main" val="1464981401"/>
+        <p14:creationId xmlns:p14="http://schemas.microsoft.com/office/powerpoint/2010/main" val="531553971"/>
       </p:ext>
     </p:extLst>
   </p:cSld>
@@ -9758,7 +10480,7 @@
           <a:p>
             <a:r>
               <a:rPr lang="de-DE" dirty="0" smtClean="0"/>
-              <a:t>Nicht gesetzte Assoziationen</a:t>
+              <a:t>Duplikate im Query Ergebnis</a:t>
             </a:r>
             <a:endParaRPr lang="de-DE" dirty="0"/>
           </a:p>
@@ -9788,31 +10510,19 @@
             <a:pPr lvl="1"/>
             <a:r>
               <a:rPr lang="de-DE" dirty="0" smtClean="0"/>
-              <a:t>Navigation führt zu </a:t>
+              <a:t>Wegen eines </a:t>
             </a:r>
             <a:r>
               <a:rPr lang="de-DE" dirty="0" err="1" smtClean="0"/>
-              <a:t>inner</a:t>
+              <a:t>Joins</a:t>
             </a:r>
             <a:r>
               <a:rPr lang="de-DE" dirty="0" smtClean="0"/>
-              <a:t> </a:t>
-            </a:r>
-            <a:r>
-              <a:rPr lang="de-DE" dirty="0" err="1" smtClean="0"/>
-              <a:t>join</a:t>
-            </a:r>
-            <a:r>
-              <a:rPr lang="de-DE" dirty="0" smtClean="0"/>
-              <a:t>, d.h. Instanzen mit leerer Assoziation sind nicht im Query Ergebnis:</a:t>
-            </a:r>
-            <a:endParaRPr lang="de-DE" dirty="0" smtClean="0"/>
-          </a:p>
-          <a:p>
-            <a:pPr marL="685800" lvl="2" indent="0">
-              <a:spcBef>
-                <a:spcPts val="600"/>
-              </a:spcBef>
+              <a:t> Duplikate im Query Ergebnis:</a:t>
+            </a:r>
+          </a:p>
+          <a:p>
+            <a:pPr marL="268287" lvl="2" indent="0">
               <a:buNone/>
             </a:pPr>
             <a:r>
@@ -9821,7 +10531,7 @@
                 <a:ea typeface="Courier New" charset="0"/>
                 <a:cs typeface="Courier New" charset="0"/>
               </a:rPr>
-              <a:t>SELECT </a:t>
+              <a:t>SELECT d FROM Department d JOIN </a:t>
             </a:r>
             <a:r>
               <a:rPr lang="de-DE" dirty="0" err="1">
@@ -9829,23 +10539,7 @@
                 <a:ea typeface="Courier New" charset="0"/>
                 <a:cs typeface="Courier New" charset="0"/>
               </a:rPr>
-              <a:t>e.department</a:t>
-            </a:r>
-            <a:r>
-              <a:rPr lang="de-DE" dirty="0">
-                <a:latin typeface="Courier New" charset="0"/>
-                <a:ea typeface="Courier New" charset="0"/>
-                <a:cs typeface="Courier New" charset="0"/>
-              </a:rPr>
-              <a:t> FROM </a:t>
-            </a:r>
-            <a:r>
-              <a:rPr lang="de-DE" dirty="0" err="1">
-                <a:latin typeface="Courier New" charset="0"/>
-                <a:ea typeface="Courier New" charset="0"/>
-                <a:cs typeface="Courier New" charset="0"/>
-              </a:rPr>
-              <a:t>Employee</a:t>
+              <a:t>d.employees</a:t>
             </a:r>
             <a:r>
               <a:rPr lang="de-DE" dirty="0">
@@ -9863,20 +10557,59 @@
               </a:rPr>
               <a:t>e</a:t>
             </a:r>
-            <a:endParaRPr lang="de-DE" sz="2800" dirty="0">
-              <a:ea typeface="ＭＳ Ｐゴシック" charset="-128"/>
-              <a:cs typeface="ＭＳ Ｐゴシック" charset="-128"/>
-            </a:endParaRPr>
+            <a:r>
+              <a:rPr lang="de-DE" dirty="0">
+                <a:latin typeface="Courier New" charset="0"/>
+                <a:ea typeface="Courier New" charset="0"/>
+                <a:cs typeface="Courier New" charset="0"/>
+              </a:rPr>
+              <a:t/>
+            </a:r>
+            <a:br>
+              <a:rPr lang="de-DE" dirty="0">
+                <a:latin typeface="Courier New" charset="0"/>
+                <a:ea typeface="Courier New" charset="0"/>
+                <a:cs typeface="Courier New" charset="0"/>
+              </a:rPr>
+            </a:br>
+            <a:r>
+              <a:rPr lang="de-DE" dirty="0">
+                <a:latin typeface="Courier New" charset="0"/>
+                <a:ea typeface="Courier New" charset="0"/>
+                <a:cs typeface="Courier New" charset="0"/>
+              </a:rPr>
+              <a:t>WHERE </a:t>
+            </a:r>
+            <a:r>
+              <a:rPr lang="de-DE" dirty="0" err="1">
+                <a:latin typeface="Courier New" charset="0"/>
+                <a:ea typeface="Courier New" charset="0"/>
+                <a:cs typeface="Courier New" charset="0"/>
+              </a:rPr>
+              <a:t>e.salary</a:t>
+            </a:r>
+            <a:r>
+              <a:rPr lang="de-DE" dirty="0">
+                <a:latin typeface="Courier New" charset="0"/>
+                <a:ea typeface="Courier New" charset="0"/>
+                <a:cs typeface="Courier New" charset="0"/>
+              </a:rPr>
+              <a:t> &gt; </a:t>
+            </a:r>
+            <a:r>
+              <a:rPr lang="de-DE" dirty="0" smtClean="0">
+                <a:latin typeface="Courier New" charset="0"/>
+                <a:ea typeface="Courier New" charset="0"/>
+                <a:cs typeface="Courier New" charset="0"/>
+              </a:rPr>
+              <a:t>1000.0d</a:t>
+            </a:r>
           </a:p>
           <a:p>
             <a:pPr marL="344487" lvl="1" indent="-342900"/>
             <a:r>
               <a:rPr lang="de-DE" dirty="0" smtClean="0"/>
-              <a:t>=&gt; OUTER </a:t>
-            </a:r>
-            <a:r>
-              <a:rPr lang="de-DE" dirty="0"/>
-              <a:t>JOIN</a:t>
+              <a:t>=&gt; DISTINCT</a:t>
             </a:r>
             <a:endParaRPr lang="de-DE" dirty="0"/>
           </a:p>
@@ -9925,9 +10658,9 @@
           <a:bodyPr/>
           <a:lstStyle/>
           <a:p>
-            <a:fld id="{D39BBA4D-B856-7B40-9294-4392DE19305E}" type="datetime1">
+            <a:fld id="{60BEC9BC-754D-1146-83C2-E61B477F4834}" type="datetime1">
               <a:rPr lang="de-DE" smtClean="0"/>
-              <a:t>16.03.16</a:t>
+              <a:t>08.01.17</a:t>
             </a:fld>
             <a:endParaRPr lang="de-DE"/>
           </a:p>
@@ -9950,7 +10683,7 @@
           <a:p>
             <a:r>
               <a:rPr lang="de-DE" smtClean="0"/>
-              <a:t>Copyright © 2015 – akquinet AG</a:t>
+              <a:t>Copyright © 2017 – akquinet AG</a:t>
             </a:r>
             <a:endParaRPr lang="de-DE"/>
           </a:p>
@@ -9959,7 +10692,7 @@
     </p:spTree>
     <p:extLst>
       <p:ext uri="{BB962C8B-B14F-4D97-AF65-F5344CB8AC3E}">
-        <p14:creationId xmlns:p14="http://schemas.microsoft.com/office/powerpoint/2010/main" val="177187756"/>
+        <p14:creationId xmlns:p14="http://schemas.microsoft.com/office/powerpoint/2010/main" val="1464981401"/>
       </p:ext>
     </p:extLst>
   </p:cSld>
@@ -10036,7 +10769,6 @@
               <a:rPr lang="de-DE" dirty="0" smtClean="0"/>
               <a:t>Aktueller Parameter Wert null führt zu leerer Ergebnismenge:</a:t>
             </a:r>
-            <a:endParaRPr lang="de-DE" dirty="0" smtClean="0"/>
           </a:p>
           <a:p>
             <a:pPr marL="685800" lvl="2" indent="0">
@@ -10183,9 +10915,9 @@
           <a:bodyPr/>
           <a:lstStyle/>
           <a:p>
-            <a:fld id="{D39BBA4D-B856-7B40-9294-4392DE19305E}" type="datetime1">
+            <a:fld id="{0210BB53-AE57-2F40-9E22-D0FE241E0439}" type="datetime1">
               <a:rPr lang="de-DE" smtClean="0"/>
-              <a:t>16.03.16</a:t>
+              <a:t>08.01.17</a:t>
             </a:fld>
             <a:endParaRPr lang="de-DE"/>
           </a:p>
@@ -10208,7 +10940,7 @@
           <a:p>
             <a:r>
               <a:rPr lang="de-DE" smtClean="0"/>
-              <a:t>Copyright © 2015 – akquinet AG</a:t>
+              <a:t>Copyright © 2017 – akquinet AG</a:t>
             </a:r>
             <a:endParaRPr lang="de-DE"/>
           </a:p>

</xml_diff>

<commit_message>
Verbesserung Folie List oder Set
</commit_message>
<xml_diff>
--- a/2016-xx-xx DF JPA Pitfalls.pptx
+++ b/2016-xx-xx DF JPA Pitfalls.pptx
@@ -303,7 +303,7 @@
           <a:p>
             <a:fld id="{433AB391-F064-9643-AD1D-16C0BE7EEBAD}" type="datetimeFigureOut">
               <a:rPr lang="de-DE" smtClean="0"/>
-              <a:t>07.02.17</a:t>
+              <a:t>16.04.17</a:t>
             </a:fld>
             <a:endParaRPr lang="de-DE"/>
           </a:p>
@@ -527,7 +527,7 @@
           </a:ln>
           <a:extLst>
             <a:ext uri="{909E8E84-426E-40dd-AFC4-6F175D3DCCD1}">
-              <a14:hiddenFill xmlns:a14="http://schemas.microsoft.com/office/drawing/2010/main" xmlns="">
+              <a14:hiddenFill xmlns="" xmlns:a14="http://schemas.microsoft.com/office/drawing/2010/main">
                 <a:solidFill>
                   <a:srgbClr val="FFFFFF"/>
                 </a:solidFill>
@@ -1051,7 +1051,7 @@
           </a:ln>
           <a:extLst>
             <a:ext uri="{91240B29-F687-4f45-9708-019B960494DF}">
-              <a14:hiddenLine xmlns:a14="http://schemas.microsoft.com/office/drawing/2010/main" xmlns="" w="9525">
+              <a14:hiddenLine xmlns="" xmlns:a14="http://schemas.microsoft.com/office/drawing/2010/main" w="9525">
                 <a:solidFill>
                   <a:srgbClr val="000000"/>
                 </a:solidFill>
@@ -1087,7 +1087,7 @@
           </a:xfrm>
           <a:extLst>
             <a:ext uri="{91240B29-F687-4f45-9708-019B960494DF}">
-              <a14:hiddenLine xmlns:a14="http://schemas.microsoft.com/office/drawing/2010/main" xmlns="" w="9525" algn="ctr">
+              <a14:hiddenLine xmlns="" xmlns:a14="http://schemas.microsoft.com/office/drawing/2010/main" w="9525" algn="ctr">
                 <a:solidFill>
                   <a:srgbClr val="000000"/>
                 </a:solidFill>
@@ -1097,7 +1097,7 @@
               </a14:hiddenLine>
             </a:ext>
             <a:ext uri="{AF507438-7753-43e0-B8FC-AC1667EBCBE1}">
-              <a14:hiddenEffects xmlns:a14="http://schemas.microsoft.com/office/drawing/2010/main" xmlns="">
+              <a14:hiddenEffects xmlns="" xmlns:a14="http://schemas.microsoft.com/office/drawing/2010/main">
                 <a:effectLst>
                   <a:outerShdw dist="35921" dir="2700000" algn="ctr" rotWithShape="0">
                     <a:srgbClr val="808080"/>
@@ -1143,7 +1143,7 @@
           </a:xfrm>
           <a:extLst>
             <a:ext uri="{91240B29-F687-4f45-9708-019B960494DF}">
-              <a14:hiddenLine xmlns:a14="http://schemas.microsoft.com/office/drawing/2010/main" xmlns="" w="9525" algn="ctr">
+              <a14:hiddenLine xmlns="" xmlns:a14="http://schemas.microsoft.com/office/drawing/2010/main" w="9525" algn="ctr">
                 <a:solidFill>
                   <a:srgbClr val="000000"/>
                 </a:solidFill>
@@ -1153,7 +1153,7 @@
               </a14:hiddenLine>
             </a:ext>
             <a:ext uri="{AF507438-7753-43e0-B8FC-AC1667EBCBE1}">
-              <a14:hiddenEffects xmlns:a14="http://schemas.microsoft.com/office/drawing/2010/main" xmlns="">
+              <a14:hiddenEffects xmlns="" xmlns:a14="http://schemas.microsoft.com/office/drawing/2010/main">
                 <a:effectLst>
                   <a:outerShdw dist="35921" dir="2700000" algn="ctr" rotWithShape="0">
                     <a:srgbClr val="808080"/>
@@ -1216,14 +1216,14 @@
           </a:ln>
           <a:extLst>
             <a:ext uri="{909E8E84-426E-40dd-AFC4-6F175D3DCCD1}">
-              <a14:hiddenFill xmlns:a14="http://schemas.microsoft.com/office/drawing/2010/main" xmlns="">
+              <a14:hiddenFill xmlns="" xmlns:a14="http://schemas.microsoft.com/office/drawing/2010/main">
                 <a:solidFill>
                   <a:srgbClr val="FFFFFF"/>
                 </a:solidFill>
               </a14:hiddenFill>
             </a:ext>
             <a:ext uri="{91240B29-F687-4f45-9708-019B960494DF}">
-              <a14:hiddenLine xmlns:a14="http://schemas.microsoft.com/office/drawing/2010/main" xmlns="" w="9525">
+              <a14:hiddenLine xmlns="" xmlns:a14="http://schemas.microsoft.com/office/drawing/2010/main" w="9525">
                 <a:solidFill>
                   <a:srgbClr val="000000"/>
                 </a:solidFill>
@@ -3734,7 +3734,7 @@
           <a:p>
             <a:fld id="{F83D804D-B1FF-3445-B74B-E1902EDCF3B2}" type="datetime1">
               <a:rPr lang="de-DE" smtClean="0"/>
-              <a:t>07.02.17</a:t>
+              <a:t>16.04.17</a:t>
             </a:fld>
             <a:endParaRPr lang="de-DE"/>
           </a:p>
@@ -3855,7 +3855,7 @@
           </a:ln>
           <a:extLst>
             <a:ext uri="{91240B29-F687-4f45-9708-019B960494DF}">
-              <a14:hiddenLine xmlns:a14="http://schemas.microsoft.com/office/drawing/2010/main" xmlns="" w="9525" algn="ctr">
+              <a14:hiddenLine xmlns="" xmlns:a14="http://schemas.microsoft.com/office/drawing/2010/main" w="9525" algn="ctr">
                 <a:solidFill>
                   <a:srgbClr val="000000"/>
                 </a:solidFill>
@@ -3950,14 +3950,14 @@
           </a:ln>
           <a:extLst>
             <a:ext uri="{909E8E84-426E-40dd-AFC4-6F175D3DCCD1}">
-              <a14:hiddenFill xmlns:a14="http://schemas.microsoft.com/office/drawing/2010/main" xmlns="">
+              <a14:hiddenFill xmlns="" xmlns:a14="http://schemas.microsoft.com/office/drawing/2010/main">
                 <a:solidFill>
                   <a:srgbClr val="FFFFFF"/>
                 </a:solidFill>
               </a14:hiddenFill>
             </a:ext>
             <a:ext uri="{91240B29-F687-4f45-9708-019B960494DF}">
-              <a14:hiddenLine xmlns:a14="http://schemas.microsoft.com/office/drawing/2010/main" xmlns="" w="9525">
+              <a14:hiddenLine xmlns="" xmlns:a14="http://schemas.microsoft.com/office/drawing/2010/main" w="9525">
                 <a:solidFill>
                   <a:srgbClr val="000000"/>
                 </a:solidFill>
@@ -4009,14 +4009,14 @@
           </a:ln>
           <a:extLst>
             <a:ext uri="{909E8E84-426E-40dd-AFC4-6F175D3DCCD1}">
-              <a14:hiddenFill xmlns:a14="http://schemas.microsoft.com/office/drawing/2010/main" xmlns="">
+              <a14:hiddenFill xmlns="" xmlns:a14="http://schemas.microsoft.com/office/drawing/2010/main">
                 <a:solidFill>
                   <a:srgbClr val="FFFFFF"/>
                 </a:solidFill>
               </a14:hiddenFill>
             </a:ext>
             <a:ext uri="{91240B29-F687-4f45-9708-019B960494DF}">
-              <a14:hiddenLine xmlns:a14="http://schemas.microsoft.com/office/drawing/2010/main" xmlns="" w="9525">
+              <a14:hiddenLine xmlns="" xmlns:a14="http://schemas.microsoft.com/office/drawing/2010/main" w="9525">
                 <a:solidFill>
                   <a:srgbClr val="000000"/>
                 </a:solidFill>
@@ -4118,7 +4118,7 @@
           <a:p>
             <a:fld id="{5882B6C0-5A1E-2048-8776-CE11CE5C9FB6}" type="datetime1">
               <a:rPr lang="de-DE" smtClean="0"/>
-              <a:t>07.02.17</a:t>
+              <a:t>16.04.17</a:t>
             </a:fld>
             <a:endParaRPr lang="de-DE"/>
           </a:p>
@@ -4468,14 +4468,14 @@
           </a:ln>
           <a:extLst>
             <a:ext uri="{909E8E84-426E-40dd-AFC4-6F175D3DCCD1}">
-              <a14:hiddenFill xmlns:a14="http://schemas.microsoft.com/office/drawing/2010/main" xmlns="">
+              <a14:hiddenFill xmlns="" xmlns:a14="http://schemas.microsoft.com/office/drawing/2010/main">
                 <a:solidFill>
                   <a:srgbClr val="FFFFFF"/>
                 </a:solidFill>
               </a14:hiddenFill>
             </a:ext>
             <a:ext uri="{91240B29-F687-4f45-9708-019B960494DF}">
-              <a14:hiddenLine xmlns:a14="http://schemas.microsoft.com/office/drawing/2010/main" xmlns="" w="9525">
+              <a14:hiddenLine xmlns="" xmlns:a14="http://schemas.microsoft.com/office/drawing/2010/main" w="9525">
                 <a:solidFill>
                   <a:srgbClr val="000000"/>
                 </a:solidFill>
@@ -7368,7 +7368,7 @@
           <a:p>
             <a:fld id="{C58B71C2-6347-8A42-9511-CBEFEE28CC08}" type="datetime1">
               <a:rPr lang="de-DE" smtClean="0"/>
-              <a:t>07.02.17</a:t>
+              <a:t>16.04.17</a:t>
             </a:fld>
             <a:endParaRPr lang="de-DE"/>
           </a:p>
@@ -7635,7 +7635,7 @@
           <a:p>
             <a:fld id="{68C14B45-0029-6046-B705-490F949C6771}" type="datetime1">
               <a:rPr lang="de-DE" smtClean="0"/>
-              <a:t>07.02.17</a:t>
+              <a:t>16.04.17</a:t>
             </a:fld>
             <a:endParaRPr lang="de-DE"/>
           </a:p>
@@ -8247,7 +8247,7 @@
           <a:p>
             <a:fld id="{08ED7225-290C-1D4B-A00D-F36093D4B0C9}" type="datetime1">
               <a:rPr lang="de-DE" smtClean="0"/>
-              <a:t>07.02.17</a:t>
+              <a:t>16.04.17</a:t>
             </a:fld>
             <a:endParaRPr lang="de-DE"/>
           </a:p>
@@ -8725,7 +8725,7 @@
           <a:p>
             <a:fld id="{FA3755DB-3A15-3248-8B53-6901EF8CCFC1}" type="datetime1">
               <a:rPr lang="de-DE" smtClean="0"/>
-              <a:t>07.02.17</a:t>
+              <a:t>16.04.17</a:t>
             </a:fld>
             <a:endParaRPr lang="de-DE"/>
           </a:p>
@@ -8863,11 +8863,7 @@
             </a:r>
             <a:r>
               <a:rPr lang="de-DE" dirty="0" smtClean="0"/>
-              <a:t> </a:t>
-            </a:r>
-            <a:r>
-              <a:rPr lang="de-DE" dirty="0" smtClean="0"/>
-              <a:t>-&gt; </a:t>
+              <a:t> -&gt; </a:t>
             </a:r>
             <a:r>
               <a:rPr lang="de-DE" dirty="0" err="1" smtClean="0"/>
@@ -9032,7 +9028,7 @@
           <a:p>
             <a:fld id="{EBA03CFD-94BB-E34B-B31A-CF6AF51CD07E}" type="datetime1">
               <a:rPr lang="de-DE" smtClean="0"/>
-              <a:t>07.02.17</a:t>
+              <a:t>16.04.17</a:t>
             </a:fld>
             <a:endParaRPr lang="de-DE"/>
           </a:p>
@@ -9460,7 +9456,7 @@
           <a:p>
             <a:fld id="{A56E7CC8-C9CF-8142-A8C1-5B4E1659A332}" type="datetime1">
               <a:rPr lang="de-DE" smtClean="0"/>
-              <a:t>07.02.17</a:t>
+              <a:t>16.04.17</a:t>
             </a:fld>
             <a:endParaRPr lang="de-DE"/>
           </a:p>
@@ -9854,7 +9850,7 @@
           <a:p>
             <a:fld id="{72BBEFD7-CB87-F245-B46B-6B59D2499ED3}" type="datetime1">
               <a:rPr lang="de-DE" smtClean="0"/>
-              <a:t>07.02.17</a:t>
+              <a:t>16.04.17</a:t>
             </a:fld>
             <a:endParaRPr lang="de-DE"/>
           </a:p>
@@ -10119,7 +10115,7 @@
           <a:p>
             <a:fld id="{0DE1AD2E-1A24-3A40-9366-C084BD9E2DDA}" type="datetime1">
               <a:rPr lang="de-DE" smtClean="0"/>
-              <a:t>07.02.17</a:t>
+              <a:t>16.04.17</a:t>
             </a:fld>
             <a:endParaRPr lang="de-DE"/>
           </a:p>
@@ -10318,7 +10314,7 @@
           <a:p>
             <a:fld id="{9C30B2D2-8E82-CB4D-9F96-067287813C01}" type="datetime1">
               <a:rPr lang="de-DE" smtClean="0"/>
-              <a:t>07.02.17</a:t>
+              <a:t>16.04.17</a:t>
             </a:fld>
             <a:endParaRPr lang="de-DE"/>
           </a:p>
@@ -10644,7 +10640,7 @@
           <a:p>
             <a:fld id="{4BEBCBD9-FF91-1D44-80A3-F726896079A4}" type="datetime1">
               <a:rPr lang="de-DE" smtClean="0"/>
-              <a:t>07.02.17</a:t>
+              <a:t>16.04.17</a:t>
             </a:fld>
             <a:endParaRPr lang="de-DE"/>
           </a:p>
@@ -10739,7 +10735,9 @@
         </p:nvSpPr>
         <p:spPr/>
         <p:txBody>
-          <a:bodyPr/>
+          <a:bodyPr>
+            <a:normAutofit/>
+          </a:bodyPr>
           <a:lstStyle/>
           <a:p>
             <a:r>
@@ -10752,7 +10750,7 @@
               <a:buNone/>
             </a:pPr>
             <a:r>
-              <a:rPr lang="de-DE" sz="2000" dirty="0">
+              <a:rPr lang="de-DE" sz="2000" dirty="0" smtClean="0">
                 <a:latin typeface="Courier New" charset="0"/>
                 <a:ea typeface="Courier New" charset="0"/>
                 <a:cs typeface="Courier New" charset="0"/>
@@ -10760,7 +10758,7 @@
               <a:t>@</a:t>
             </a:r>
             <a:r>
-              <a:rPr lang="de-DE" sz="2000" dirty="0" err="1">
+              <a:rPr lang="de-DE" sz="2000" dirty="0" err="1" smtClean="0">
                 <a:latin typeface="Courier New" charset="0"/>
                 <a:ea typeface="Courier New" charset="0"/>
                 <a:cs typeface="Courier New" charset="0"/>
@@ -10768,7 +10766,7 @@
               <a:t>OneToMany</a:t>
             </a:r>
             <a:r>
-              <a:rPr lang="de-DE" sz="2000" dirty="0">
+              <a:rPr lang="de-DE" sz="2000" dirty="0" smtClean="0">
                 <a:latin typeface="Courier New" charset="0"/>
                 <a:ea typeface="Courier New" charset="0"/>
                 <a:cs typeface="Courier New" charset="0"/>
@@ -10776,7 +10774,7 @@
               <a:t>(</a:t>
             </a:r>
             <a:r>
-              <a:rPr lang="de-DE" sz="2000" dirty="0" err="1">
+              <a:rPr lang="de-DE" sz="2000" dirty="0" err="1" smtClean="0">
                 <a:latin typeface="Courier New" charset="0"/>
                 <a:ea typeface="Courier New" charset="0"/>
                 <a:cs typeface="Courier New" charset="0"/>
@@ -10784,7 +10782,7 @@
               <a:t>mappedBy</a:t>
             </a:r>
             <a:r>
-              <a:rPr lang="de-DE" sz="2000" dirty="0">
+              <a:rPr lang="de-DE" sz="2000" dirty="0" smtClean="0">
                 <a:latin typeface="Courier New" charset="0"/>
                 <a:ea typeface="Courier New" charset="0"/>
                 <a:cs typeface="Courier New" charset="0"/>
@@ -10792,7 +10790,7 @@
               <a:t> = "</a:t>
             </a:r>
             <a:r>
-              <a:rPr lang="de-DE" sz="2000" dirty="0" err="1">
+              <a:rPr lang="de-DE" sz="2000" dirty="0" err="1" smtClean="0">
                 <a:latin typeface="Courier New" charset="0"/>
                 <a:ea typeface="Courier New" charset="0"/>
                 <a:cs typeface="Courier New" charset="0"/>
@@ -10851,18 +10849,10 @@
                 <a:ea typeface="Courier New" charset="0"/>
                 <a:cs typeface="Courier New" charset="0"/>
               </a:rPr>
-              <a:t>private </a:t>
-            </a:r>
-            <a:r>
-              <a:rPr lang="de-DE" sz="2000" dirty="0">
-                <a:latin typeface="Courier New" charset="0"/>
-                <a:ea typeface="Courier New" charset="0"/>
-                <a:cs typeface="Courier New" charset="0"/>
-              </a:rPr>
-              <a:t>List&lt;</a:t>
-            </a:r>
-            <a:r>
-              <a:rPr lang="de-DE" sz="2000" dirty="0" err="1">
+              <a:t>private List&lt;</a:t>
+            </a:r>
+            <a:r>
+              <a:rPr lang="de-DE" sz="2000" dirty="0" err="1" smtClean="0">
                 <a:latin typeface="Courier New" charset="0"/>
                 <a:ea typeface="Courier New" charset="0"/>
                 <a:cs typeface="Courier New" charset="0"/>
@@ -10870,7 +10860,7 @@
               <a:t>EmployeeUsingList</a:t>
             </a:r>
             <a:r>
-              <a:rPr lang="de-DE" sz="2000" dirty="0">
+              <a:rPr lang="de-DE" sz="2000" dirty="0" smtClean="0">
                 <a:latin typeface="Courier New" charset="0"/>
                 <a:ea typeface="Courier New" charset="0"/>
                 <a:cs typeface="Courier New" charset="0"/>
@@ -10878,7 +10868,7 @@
               <a:t>&gt; </a:t>
             </a:r>
             <a:r>
-              <a:rPr lang="de-DE" sz="2000" dirty="0" err="1">
+              <a:rPr lang="de-DE" sz="2000" dirty="0" err="1" smtClean="0">
                 <a:latin typeface="Courier New" charset="0"/>
                 <a:ea typeface="Courier New" charset="0"/>
                 <a:cs typeface="Courier New" charset="0"/>
@@ -10887,139 +10877,6 @@
             </a:r>
             <a:r>
               <a:rPr lang="de-DE" sz="2000" dirty="0" smtClean="0">
-                <a:latin typeface="Courier New" charset="0"/>
-                <a:ea typeface="Courier New" charset="0"/>
-                <a:cs typeface="Courier New" charset="0"/>
-              </a:rPr>
-              <a:t>;</a:t>
-            </a:r>
-            <a:br>
-              <a:rPr lang="de-DE" sz="2000" dirty="0" smtClean="0">
-                <a:latin typeface="Courier New" charset="0"/>
-                <a:ea typeface="Courier New" charset="0"/>
-                <a:cs typeface="Courier New" charset="0"/>
-              </a:rPr>
-            </a:br>
-            <a:r>
-              <a:rPr lang="de-DE" sz="2000" dirty="0" smtClean="0">
-                <a:latin typeface="Courier New" charset="0"/>
-                <a:ea typeface="Courier New" charset="0"/>
-                <a:cs typeface="Courier New" charset="0"/>
-              </a:rPr>
-              <a:t/>
-            </a:r>
-            <a:br>
-              <a:rPr lang="de-DE" sz="2000" dirty="0" smtClean="0">
-                <a:latin typeface="Courier New" charset="0"/>
-                <a:ea typeface="Courier New" charset="0"/>
-                <a:cs typeface="Courier New" charset="0"/>
-              </a:rPr>
-            </a:br>
-            <a:r>
-              <a:rPr lang="de-DE" sz="2000" dirty="0" smtClean="0">
-                <a:latin typeface="Courier New" charset="0"/>
-                <a:ea typeface="Courier New" charset="0"/>
-                <a:cs typeface="Courier New" charset="0"/>
-              </a:rPr>
-              <a:t>@</a:t>
-            </a:r>
-            <a:r>
-              <a:rPr lang="de-DE" sz="2000" dirty="0" err="1">
-                <a:latin typeface="Courier New" charset="0"/>
-                <a:ea typeface="Courier New" charset="0"/>
-                <a:cs typeface="Courier New" charset="0"/>
-              </a:rPr>
-              <a:t>OneToMany</a:t>
-            </a:r>
-            <a:r>
-              <a:rPr lang="de-DE" sz="2000" dirty="0">
-                <a:latin typeface="Courier New" charset="0"/>
-                <a:ea typeface="Courier New" charset="0"/>
-                <a:cs typeface="Courier New" charset="0"/>
-              </a:rPr>
-              <a:t>(</a:t>
-            </a:r>
-            <a:r>
-              <a:rPr lang="de-DE" sz="2000" dirty="0" err="1">
-                <a:latin typeface="Courier New" charset="0"/>
-                <a:ea typeface="Courier New" charset="0"/>
-                <a:cs typeface="Courier New" charset="0"/>
-              </a:rPr>
-              <a:t>mappedBy</a:t>
-            </a:r>
-            <a:r>
-              <a:rPr lang="de-DE" sz="2000" dirty="0">
-                <a:latin typeface="Courier New" charset="0"/>
-                <a:ea typeface="Courier New" charset="0"/>
-                <a:cs typeface="Courier New" charset="0"/>
-              </a:rPr>
-              <a:t> = "</a:t>
-            </a:r>
-            <a:r>
-              <a:rPr lang="de-DE" sz="2000" dirty="0" err="1" smtClean="0">
-                <a:latin typeface="Courier New" charset="0"/>
-                <a:ea typeface="Courier New" charset="0"/>
-                <a:cs typeface="Courier New" charset="0"/>
-              </a:rPr>
-              <a:t>department</a:t>
-            </a:r>
-            <a:r>
-              <a:rPr lang="de-DE" sz="2000" dirty="0" smtClean="0">
-                <a:latin typeface="Courier New" charset="0"/>
-                <a:ea typeface="Courier New" charset="0"/>
-                <a:cs typeface="Courier New" charset="0"/>
-              </a:rPr>
-              <a:t>) </a:t>
-            </a:r>
-            <a:br>
-              <a:rPr lang="de-DE" sz="2000" dirty="0" smtClean="0">
-                <a:latin typeface="Courier New" charset="0"/>
-                <a:ea typeface="Courier New" charset="0"/>
-                <a:cs typeface="Courier New" charset="0"/>
-              </a:rPr>
-            </a:br>
-            <a:r>
-              <a:rPr lang="de-DE" sz="2000" dirty="0" smtClean="0">
-                <a:latin typeface="Courier New" charset="0"/>
-                <a:ea typeface="Courier New" charset="0"/>
-                <a:cs typeface="Courier New" charset="0"/>
-              </a:rPr>
-              <a:t>private </a:t>
-            </a:r>
-            <a:r>
-              <a:rPr lang="de-DE" sz="2000" dirty="0">
-                <a:latin typeface="Courier New" charset="0"/>
-                <a:ea typeface="Courier New" charset="0"/>
-                <a:cs typeface="Courier New" charset="0"/>
-              </a:rPr>
-              <a:t>Set&lt;</a:t>
-            </a:r>
-            <a:r>
-              <a:rPr lang="de-DE" sz="2000" dirty="0" err="1">
-                <a:latin typeface="Courier New" charset="0"/>
-                <a:ea typeface="Courier New" charset="0"/>
-                <a:cs typeface="Courier New" charset="0"/>
-              </a:rPr>
-              <a:t>EmployeeUsingSet</a:t>
-            </a:r>
-            <a:r>
-              <a:rPr lang="de-DE" sz="2000" dirty="0">
-                <a:latin typeface="Courier New" charset="0"/>
-                <a:ea typeface="Courier New" charset="0"/>
-                <a:cs typeface="Courier New" charset="0"/>
-              </a:rPr>
-              <a:t>&gt; </a:t>
-            </a:r>
-            <a:r>
-              <a:rPr lang="de-DE" sz="2000" dirty="0" err="1">
-                <a:latin typeface="Courier New" charset="0"/>
-                <a:ea typeface="Courier New" charset="0"/>
-                <a:cs typeface="Courier New" charset="0"/>
-              </a:rPr>
-              <a:t>employees</a:t>
-            </a:r>
-            <a:r>
-              <a:rPr lang="de-DE" sz="2000" dirty="0">
                 <a:latin typeface="Courier New" charset="0"/>
                 <a:ea typeface="Courier New" charset="0"/>
                 <a:cs typeface="Courier New" charset="0"/>
@@ -11047,7 +10904,122 @@
               <a:rPr lang="de-DE" dirty="0" smtClean="0"/>
               <a:t>Index-Berechnung beim Einfügen</a:t>
             </a:r>
-            <a:endParaRPr lang="de-DE" dirty="0"/>
+          </a:p>
+          <a:p>
+            <a:pPr lvl="1"/>
+            <a:r>
+              <a:rPr lang="de-DE" dirty="0" smtClean="0"/>
+              <a:t>Besser:</a:t>
+            </a:r>
+            <a:endParaRPr lang="de-DE" dirty="0" smtClean="0"/>
+          </a:p>
+          <a:p>
+            <a:pPr marL="268287" lvl="2" indent="0">
+              <a:buNone/>
+            </a:pPr>
+            <a:r>
+              <a:rPr lang="de-DE" sz="2100" dirty="0">
+                <a:latin typeface="Courier New" charset="0"/>
+                <a:ea typeface="Courier New" charset="0"/>
+                <a:cs typeface="Courier New" charset="0"/>
+              </a:rPr>
+              <a:t>@</a:t>
+            </a:r>
+            <a:r>
+              <a:rPr lang="de-DE" sz="2100" dirty="0" err="1">
+                <a:latin typeface="Courier New" charset="0"/>
+                <a:ea typeface="Courier New" charset="0"/>
+                <a:cs typeface="Courier New" charset="0"/>
+              </a:rPr>
+              <a:t>OneToMany</a:t>
+            </a:r>
+            <a:r>
+              <a:rPr lang="de-DE" sz="2100" dirty="0">
+                <a:latin typeface="Courier New" charset="0"/>
+                <a:ea typeface="Courier New" charset="0"/>
+                <a:cs typeface="Courier New" charset="0"/>
+              </a:rPr>
+              <a:t>(</a:t>
+            </a:r>
+            <a:r>
+              <a:rPr lang="de-DE" sz="2100" dirty="0" err="1">
+                <a:latin typeface="Courier New" charset="0"/>
+                <a:ea typeface="Courier New" charset="0"/>
+                <a:cs typeface="Courier New" charset="0"/>
+              </a:rPr>
+              <a:t>mappedBy</a:t>
+            </a:r>
+            <a:r>
+              <a:rPr lang="de-DE" sz="2100" dirty="0">
+                <a:latin typeface="Courier New" charset="0"/>
+                <a:ea typeface="Courier New" charset="0"/>
+                <a:cs typeface="Courier New" charset="0"/>
+              </a:rPr>
+              <a:t> = "</a:t>
+            </a:r>
+            <a:r>
+              <a:rPr lang="de-DE" sz="2100" dirty="0" err="1">
+                <a:latin typeface="Courier New" charset="0"/>
+                <a:ea typeface="Courier New" charset="0"/>
+                <a:cs typeface="Courier New" charset="0"/>
+              </a:rPr>
+              <a:t>department</a:t>
+            </a:r>
+            <a:r>
+              <a:rPr lang="de-DE" sz="2100" dirty="0">
+                <a:latin typeface="Courier New" charset="0"/>
+                <a:ea typeface="Courier New" charset="0"/>
+                <a:cs typeface="Courier New" charset="0"/>
+              </a:rPr>
+              <a:t>) </a:t>
+            </a:r>
+            <a:br>
+              <a:rPr lang="de-DE" sz="2100" dirty="0">
+                <a:latin typeface="Courier New" charset="0"/>
+                <a:ea typeface="Courier New" charset="0"/>
+                <a:cs typeface="Courier New" charset="0"/>
+              </a:rPr>
+            </a:br>
+            <a:r>
+              <a:rPr lang="de-DE" sz="2100" dirty="0">
+                <a:latin typeface="Courier New" charset="0"/>
+                <a:ea typeface="Courier New" charset="0"/>
+                <a:cs typeface="Courier New" charset="0"/>
+              </a:rPr>
+              <a:t>private Set&lt;</a:t>
+            </a:r>
+            <a:r>
+              <a:rPr lang="de-DE" sz="2100" dirty="0" err="1">
+                <a:latin typeface="Courier New" charset="0"/>
+                <a:ea typeface="Courier New" charset="0"/>
+                <a:cs typeface="Courier New" charset="0"/>
+              </a:rPr>
+              <a:t>EmployeeUsingSet</a:t>
+            </a:r>
+            <a:r>
+              <a:rPr lang="de-DE" sz="2100" dirty="0">
+                <a:latin typeface="Courier New" charset="0"/>
+                <a:ea typeface="Courier New" charset="0"/>
+                <a:cs typeface="Courier New" charset="0"/>
+              </a:rPr>
+              <a:t>&gt; </a:t>
+            </a:r>
+            <a:r>
+              <a:rPr lang="de-DE" sz="2100" dirty="0" err="1">
+                <a:latin typeface="Courier New" charset="0"/>
+                <a:ea typeface="Courier New" charset="0"/>
+                <a:cs typeface="Courier New" charset="0"/>
+              </a:rPr>
+              <a:t>employees</a:t>
+            </a:r>
+            <a:r>
+              <a:rPr lang="de-DE" sz="2100" dirty="0">
+                <a:latin typeface="Courier New" charset="0"/>
+                <a:ea typeface="Courier New" charset="0"/>
+                <a:cs typeface="Courier New" charset="0"/>
+              </a:rPr>
+              <a:t>;</a:t>
+            </a:r>
           </a:p>
         </p:txBody>
       </p:sp>
@@ -11092,7 +11064,7 @@
           <a:p>
             <a:fld id="{62C6873C-8111-7F45-A7BE-933B4DE2F40D}" type="datetime1">
               <a:rPr lang="de-DE" smtClean="0"/>
-              <a:t>07.02.17</a:t>
+              <a:t>16.04.17</a:t>
             </a:fld>
             <a:endParaRPr lang="de-DE"/>
           </a:p>
@@ -11612,7 +11584,7 @@
           <a:p>
             <a:fld id="{CE4A19BA-41E2-C042-8713-45BADC4EE82A}" type="datetime1">
               <a:rPr lang="de-DE" smtClean="0"/>
-              <a:t>07.02.17</a:t>
+              <a:t>16.04.17</a:t>
             </a:fld>
             <a:endParaRPr lang="de-DE"/>
           </a:p>
@@ -12186,7 +12158,7 @@
           <a:p>
             <a:fld id="{C266EE62-481F-2F48-8D5C-A71639B4BBF5}" type="datetime1">
               <a:rPr lang="de-DE" smtClean="0"/>
-              <a:t>07.02.17</a:t>
+              <a:t>16.04.17</a:t>
             </a:fld>
             <a:endParaRPr lang="de-DE"/>
           </a:p>
@@ -12383,7 +12355,7 @@
           <a:p>
             <a:fld id="{6BCCCC64-9CD8-E04D-BADD-1EDEE83CAAAB}" type="datetime1">
               <a:rPr lang="de-DE" smtClean="0"/>
-              <a:t>07.02.17</a:t>
+              <a:t>16.04.17</a:t>
             </a:fld>
             <a:endParaRPr lang="de-DE"/>
           </a:p>
@@ -13084,7 +13056,7 @@
           <a:p>
             <a:fld id="{47DA42F9-2F5E-A94D-8018-6CC78E4F8339}" type="datetime1">
               <a:rPr lang="de-DE" smtClean="0"/>
-              <a:t>07.02.17</a:t>
+              <a:t>16.04.17</a:t>
             </a:fld>
             <a:endParaRPr lang="de-DE"/>
           </a:p>
@@ -13998,7 +13970,7 @@
           <a:p>
             <a:fld id="{60BEC9BC-754D-1146-83C2-E61B477F4834}" type="datetime1">
               <a:rPr lang="de-DE" smtClean="0"/>
-              <a:t>07.02.17</a:t>
+              <a:t>16.04.17</a:t>
             </a:fld>
             <a:endParaRPr lang="de-DE"/>
           </a:p>
@@ -14100,15 +14072,7 @@
           <a:p>
             <a:r>
               <a:rPr lang="de-DE" dirty="0" smtClean="0"/>
-              <a:t>Parameter Wert null in </a:t>
-            </a:r>
-            <a:r>
-              <a:rPr lang="de-DE" dirty="0" smtClean="0"/>
-              <a:t>JPQL </a:t>
-            </a:r>
-            <a:r>
-              <a:rPr lang="de-DE" dirty="0" smtClean="0"/>
-              <a:t>Query</a:t>
+              <a:t>Parameter Wert null in JPQL Query</a:t>
             </a:r>
           </a:p>
           <a:p>
@@ -14412,7 +14376,7 @@
           <a:p>
             <a:fld id="{0210BB53-AE57-2F40-9E22-D0FE241E0439}" type="datetime1">
               <a:rPr lang="de-DE" smtClean="0"/>
-              <a:t>07.02.17</a:t>
+              <a:t>16.04.17</a:t>
             </a:fld>
             <a:endParaRPr lang="de-DE"/>
           </a:p>

</xml_diff>